<commit_message>
Try multiple idea for art
</commit_message>
<xml_diff>
--- a/Assets/Presentation1.pptx
+++ b/Assets/Presentation1.pptx
@@ -6,6 +6,7 @@
   </p:sldMasterIdLst>
   <p:sldIdLst>
     <p:sldId id="256" r:id="rId2"/>
+    <p:sldId id="257" r:id="rId3"/>
   </p:sldIdLst>
   <p:sldSz cx="12192000" cy="6858000"/>
   <p:notesSz cx="6858000" cy="9144000"/>
@@ -104,6 +105,11 @@
       </a:defRPr>
     </a:lvl9pPr>
   </p:defaultTextStyle>
+  <p:extLst>
+    <p:ext uri="{EFAFB233-063F-42B5-8137-9DF3F51BA10A}">
+      <p15:sldGuideLst xmlns:p15="http://schemas.microsoft.com/office/powerpoint/2012/main"/>
+    </p:ext>
+  </p:extLst>
 </p:presentation>
 </file>
 
@@ -238,7 +244,7 @@
           <a:p>
             <a:fld id="{C7AF76CE-EDF0-48E5-9988-C6B59D81104F}" type="datetimeFigureOut">
               <a:rPr lang="en-US" smtClean="0"/>
-              <a:t>4/17/2021</a:t>
+              <a:t>5/2/2021</a:t>
             </a:fld>
             <a:endParaRPr lang="en-US"/>
           </a:p>
@@ -408,7 +414,7 @@
           <a:p>
             <a:fld id="{C7AF76CE-EDF0-48E5-9988-C6B59D81104F}" type="datetimeFigureOut">
               <a:rPr lang="en-US" smtClean="0"/>
-              <a:t>4/17/2021</a:t>
+              <a:t>5/2/2021</a:t>
             </a:fld>
             <a:endParaRPr lang="en-US"/>
           </a:p>
@@ -588,7 +594,7 @@
           <a:p>
             <a:fld id="{C7AF76CE-EDF0-48E5-9988-C6B59D81104F}" type="datetimeFigureOut">
               <a:rPr lang="en-US" smtClean="0"/>
-              <a:t>4/17/2021</a:t>
+              <a:t>5/2/2021</a:t>
             </a:fld>
             <a:endParaRPr lang="en-US"/>
           </a:p>
@@ -758,7 +764,7 @@
           <a:p>
             <a:fld id="{C7AF76CE-EDF0-48E5-9988-C6B59D81104F}" type="datetimeFigureOut">
               <a:rPr lang="en-US" smtClean="0"/>
-              <a:t>4/17/2021</a:t>
+              <a:t>5/2/2021</a:t>
             </a:fld>
             <a:endParaRPr lang="en-US"/>
           </a:p>
@@ -1004,7 +1010,7 @@
           <a:p>
             <a:fld id="{C7AF76CE-EDF0-48E5-9988-C6B59D81104F}" type="datetimeFigureOut">
               <a:rPr lang="en-US" smtClean="0"/>
-              <a:t>4/17/2021</a:t>
+              <a:t>5/2/2021</a:t>
             </a:fld>
             <a:endParaRPr lang="en-US"/>
           </a:p>
@@ -1236,7 +1242,7 @@
           <a:p>
             <a:fld id="{C7AF76CE-EDF0-48E5-9988-C6B59D81104F}" type="datetimeFigureOut">
               <a:rPr lang="en-US" smtClean="0"/>
-              <a:t>4/17/2021</a:t>
+              <a:t>5/2/2021</a:t>
             </a:fld>
             <a:endParaRPr lang="en-US"/>
           </a:p>
@@ -1603,7 +1609,7 @@
           <a:p>
             <a:fld id="{C7AF76CE-EDF0-48E5-9988-C6B59D81104F}" type="datetimeFigureOut">
               <a:rPr lang="en-US" smtClean="0"/>
-              <a:t>4/17/2021</a:t>
+              <a:t>5/2/2021</a:t>
             </a:fld>
             <a:endParaRPr lang="en-US"/>
           </a:p>
@@ -1721,7 +1727,7 @@
           <a:p>
             <a:fld id="{C7AF76CE-EDF0-48E5-9988-C6B59D81104F}" type="datetimeFigureOut">
               <a:rPr lang="en-US" smtClean="0"/>
-              <a:t>4/17/2021</a:t>
+              <a:t>5/2/2021</a:t>
             </a:fld>
             <a:endParaRPr lang="en-US"/>
           </a:p>
@@ -1816,7 +1822,7 @@
           <a:p>
             <a:fld id="{C7AF76CE-EDF0-48E5-9988-C6B59D81104F}" type="datetimeFigureOut">
               <a:rPr lang="en-US" smtClean="0"/>
-              <a:t>4/17/2021</a:t>
+              <a:t>5/2/2021</a:t>
             </a:fld>
             <a:endParaRPr lang="en-US"/>
           </a:p>
@@ -2093,7 +2099,7 @@
           <a:p>
             <a:fld id="{C7AF76CE-EDF0-48E5-9988-C6B59D81104F}" type="datetimeFigureOut">
               <a:rPr lang="en-US" smtClean="0"/>
-              <a:t>4/17/2021</a:t>
+              <a:t>5/2/2021</a:t>
             </a:fld>
             <a:endParaRPr lang="en-US"/>
           </a:p>
@@ -2346,7 +2352,7 @@
           <a:p>
             <a:fld id="{C7AF76CE-EDF0-48E5-9988-C6B59D81104F}" type="datetimeFigureOut">
               <a:rPr lang="en-US" smtClean="0"/>
-              <a:t>4/17/2021</a:t>
+              <a:t>5/2/2021</a:t>
             </a:fld>
             <a:endParaRPr lang="en-US"/>
           </a:p>
@@ -2559,7 +2565,7 @@
           <a:p>
             <a:fld id="{C7AF76CE-EDF0-48E5-9988-C6B59D81104F}" type="datetimeFigureOut">
               <a:rPr lang="en-US" smtClean="0"/>
-              <a:t>4/17/2021</a:t>
+              <a:t>5/2/2021</a:t>
             </a:fld>
             <a:endParaRPr lang="en-US"/>
           </a:p>
@@ -2966,47 +2972,65 @@
       </p:grpSpPr>
       <p:sp>
         <p:nvSpPr>
-          <p:cNvPr id="4" name="Oval 3"/>
+          <p:cNvPr id="2" name="Rectangle 1"/>
           <p:cNvSpPr/>
           <p:nvPr/>
         </p:nvSpPr>
         <p:spPr>
           <a:xfrm>
-            <a:off x="3226526" y="1031966"/>
-            <a:ext cx="3370217" cy="3161211"/>
+            <a:off x="1229249" y="866167"/>
+            <a:ext cx="3240000" cy="3240000"/>
           </a:xfrm>
-          <a:prstGeom prst="ellipse">
+          <a:prstGeom prst="rect">
             <a:avLst/>
           </a:prstGeom>
           <a:gradFill flip="none" rotWithShape="1">
             <a:gsLst>
-              <a:gs pos="82000">
-                <a:schemeClr val="accent1">
-                  <a:tint val="66000"/>
-                  <a:satMod val="160000"/>
-                </a:schemeClr>
+              <a:gs pos="100000">
+                <a:srgbClr val="00B0F0"/>
               </a:gs>
-              <a:gs pos="43000">
-                <a:srgbClr val="C1D8F8">
-                  <a:alpha val="47843"/>
-                </a:srgbClr>
+              <a:gs pos="81000">
+                <a:srgbClr val="79C2F3"/>
               </a:gs>
               <a:gs pos="4000">
-                <a:srgbClr val="E1ECFB">
-                  <a:alpha val="20000"/>
-                </a:srgbClr>
+                <a:srgbClr val="9BE5EF"/>
               </a:gs>
             </a:gsLst>
-            <a:path path="circle">
+            <a:path path="rect">
               <a:fillToRect l="50000" t="50000" r="50000" b="50000"/>
             </a:path>
             <a:tileRect/>
           </a:gradFill>
-          <a:ln w="19050">
+          <a:ln>
             <a:solidFill>
-              <a:srgbClr val="C1D8F8"/>
+              <a:srgbClr val="F8CDC4"/>
             </a:solidFill>
           </a:ln>
+          <a:effectLst>
+            <a:glow rad="101600">
+              <a:schemeClr val="accent1">
+                <a:satMod val="175000"/>
+                <a:alpha val="40000"/>
+              </a:schemeClr>
+            </a:glow>
+            <a:softEdge rad="279400"/>
+          </a:effectLst>
+          <a:scene3d>
+            <a:camera prst="orthographicFront"/>
+            <a:lightRig rig="threePt" dir="t">
+              <a:rot lat="0" lon="0" rev="4200000"/>
+            </a:lightRig>
+          </a:scene3d>
+          <a:sp3d contourW="12700" prstMaterial="matte">
+            <a:bevelT w="241300" h="260350" prst="relaxedInset"/>
+            <a:bevelB prst="slope"/>
+            <a:contourClr>
+              <a:schemeClr val="accent1">
+                <a:lumMod val="60000"/>
+                <a:lumOff val="40000"/>
+              </a:schemeClr>
+            </a:contourClr>
+          </a:sp3d>
         </p:spPr>
         <p:style>
           <a:lnRef idx="2">
@@ -3035,44 +3059,65 @@
       </p:sp>
       <p:sp>
         <p:nvSpPr>
-          <p:cNvPr id="7" name="Oval 6"/>
+          <p:cNvPr id="5" name="Rectangle 4"/>
           <p:cNvSpPr/>
           <p:nvPr/>
         </p:nvSpPr>
         <p:spPr>
           <a:xfrm>
-            <a:off x="7585167" y="1212502"/>
-            <a:ext cx="3370217" cy="3161211"/>
+            <a:off x="4926709" y="894378"/>
+            <a:ext cx="3240000" cy="3240000"/>
           </a:xfrm>
-          <a:prstGeom prst="ellipse">
+          <a:prstGeom prst="rect">
             <a:avLst/>
           </a:prstGeom>
           <a:gradFill flip="none" rotWithShape="1">
             <a:gsLst>
-              <a:gs pos="87000">
-                <a:srgbClr val="ED4141"/>
+              <a:gs pos="100000">
+                <a:srgbClr val="F22626"/>
               </a:gs>
-              <a:gs pos="43000">
-                <a:srgbClr val="F6A18A">
-                  <a:alpha val="47451"/>
-                </a:srgbClr>
+              <a:gs pos="82000">
+                <a:srgbClr val="E47878"/>
               </a:gs>
-              <a:gs pos="4000">
-                <a:srgbClr val="F8CDC4">
-                  <a:alpha val="20000"/>
-                </a:srgbClr>
+              <a:gs pos="19000">
+                <a:srgbClr val="E3A1A1"/>
               </a:gs>
             </a:gsLst>
-            <a:path path="circle">
+            <a:path path="rect">
               <a:fillToRect l="50000" t="50000" r="50000" b="50000"/>
             </a:path>
             <a:tileRect/>
           </a:gradFill>
-          <a:ln w="19050">
+          <a:ln>
             <a:solidFill>
               <a:srgbClr val="F8CDC4"/>
             </a:solidFill>
           </a:ln>
+          <a:effectLst>
+            <a:glow rad="101600">
+              <a:schemeClr val="accent1">
+                <a:satMod val="175000"/>
+                <a:alpha val="40000"/>
+              </a:schemeClr>
+            </a:glow>
+            <a:softEdge rad="279400"/>
+          </a:effectLst>
+          <a:scene3d>
+            <a:camera prst="orthographicFront"/>
+            <a:lightRig rig="threePt" dir="t">
+              <a:rot lat="0" lon="0" rev="18000000"/>
+            </a:lightRig>
+          </a:scene3d>
+          <a:sp3d contourW="12700" prstMaterial="matte">
+            <a:bevelT w="241300" h="260350" prst="relaxedInset"/>
+            <a:bevelB prst="slope"/>
+            <a:contourClr>
+              <a:schemeClr val="accent1">
+                <a:lumMod val="60000"/>
+                <a:lumOff val="40000"/>
+              </a:schemeClr>
+            </a:contourClr>
+          </a:sp3d>
         </p:spPr>
         <p:style>
           <a:lnRef idx="2">
@@ -3099,6 +3144,429 @@
           </a:p>
         </p:txBody>
       </p:sp>
+      <p:pic>
+        <p:nvPicPr>
+          <p:cNvPr id="32" name="Picture 31"/>
+          <p:cNvPicPr>
+            <a:picLocks noChangeAspect="1"/>
+          </p:cNvPicPr>
+          <p:nvPr/>
+        </p:nvPicPr>
+        <p:blipFill>
+          <a:blip r:embed="rId2">
+            <a:extLst>
+              <a:ext uri="{28A0092B-C50C-407E-A947-70E740481C1C}">
+                <a14:useLocalDpi xmlns:a14="http://schemas.microsoft.com/office/drawing/2010/main" val="0"/>
+              </a:ext>
+            </a:extLst>
+          </a:blip>
+          <a:stretch>
+            <a:fillRect/>
+          </a:stretch>
+        </p:blipFill>
+        <p:spPr>
+          <a:xfrm>
+            <a:off x="648533" y="2583117"/>
+            <a:ext cx="3377477" cy="3170195"/>
+          </a:xfrm>
+          <a:prstGeom prst="rect">
+            <a:avLst/>
+          </a:prstGeom>
+        </p:spPr>
+      </p:pic>
+      <p:pic>
+        <p:nvPicPr>
+          <p:cNvPr id="33" name="Picture 32"/>
+          <p:cNvPicPr>
+            <a:picLocks noChangeAspect="1"/>
+          </p:cNvPicPr>
+          <p:nvPr/>
+        </p:nvPicPr>
+        <p:blipFill>
+          <a:blip r:embed="rId3">
+            <a:extLst>
+              <a:ext uri="{28A0092B-C50C-407E-A947-70E740481C1C}">
+                <a14:useLocalDpi xmlns:a14="http://schemas.microsoft.com/office/drawing/2010/main" val="0"/>
+              </a:ext>
+            </a:extLst>
+          </a:blip>
+          <a:stretch>
+            <a:fillRect/>
+          </a:stretch>
+        </p:blipFill>
+        <p:spPr>
+          <a:xfrm>
+            <a:off x="1386270" y="918324"/>
+            <a:ext cx="3377477" cy="3170195"/>
+          </a:xfrm>
+          <a:prstGeom prst="rect">
+            <a:avLst/>
+          </a:prstGeom>
+        </p:spPr>
+      </p:pic>
+      <p:grpSp>
+        <p:nvGrpSpPr>
+          <p:cNvPr id="42" name="Group 41"/>
+          <p:cNvGrpSpPr/>
+          <p:nvPr/>
+        </p:nvGrpSpPr>
+        <p:grpSpPr>
+          <a:xfrm>
+            <a:off x="4803677" y="2583117"/>
+            <a:ext cx="3377477" cy="3170195"/>
+            <a:chOff x="4803677" y="2583117"/>
+            <a:chExt cx="3377477" cy="3170195"/>
+          </a:xfrm>
+        </p:grpSpPr>
+        <p:grpSp>
+          <p:nvGrpSpPr>
+            <p:cNvPr id="27" name="Group 26"/>
+            <p:cNvGrpSpPr/>
+            <p:nvPr/>
+          </p:nvGrpSpPr>
+          <p:grpSpPr>
+            <a:xfrm>
+              <a:off x="4803677" y="2583117"/>
+              <a:ext cx="3377477" cy="3170195"/>
+              <a:chOff x="4803677" y="2583117"/>
+              <a:chExt cx="3377477" cy="3170195"/>
+            </a:xfrm>
+          </p:grpSpPr>
+          <p:grpSp>
+            <p:nvGrpSpPr>
+              <p:cNvPr id="15" name="Group 14"/>
+              <p:cNvGrpSpPr/>
+              <p:nvPr/>
+            </p:nvGrpSpPr>
+            <p:grpSpPr>
+              <a:xfrm>
+                <a:off x="4803677" y="2583117"/>
+                <a:ext cx="3377477" cy="3170195"/>
+                <a:chOff x="2426365" y="3126743"/>
+                <a:chExt cx="3377477" cy="3170195"/>
+              </a:xfrm>
+            </p:grpSpPr>
+            <p:pic>
+              <p:nvPicPr>
+                <p:cNvPr id="6" name="Picture 5"/>
+                <p:cNvPicPr>
+                  <a:picLocks noChangeAspect="1"/>
+                </p:cNvPicPr>
+                <p:nvPr/>
+              </p:nvPicPr>
+              <p:blipFill>
+                <a:blip r:embed="rId3">
+                  <a:extLst>
+                    <a:ext uri="{28A0092B-C50C-407E-A947-70E740481C1C}">
+                      <a14:useLocalDpi xmlns:a14="http://schemas.microsoft.com/office/drawing/2010/main" val="0"/>
+                    </a:ext>
+                  </a:extLst>
+                </a:blip>
+                <a:stretch>
+                  <a:fillRect/>
+                </a:stretch>
+              </p:blipFill>
+              <p:spPr>
+                <a:xfrm>
+                  <a:off x="2426365" y="3126743"/>
+                  <a:ext cx="3377477" cy="3170195"/>
+                </a:xfrm>
+                <a:prstGeom prst="rect">
+                  <a:avLst/>
+                </a:prstGeom>
+              </p:spPr>
+            </p:pic>
+            <p:cxnSp>
+              <p:nvCxnSpPr>
+                <p:cNvPr id="14" name="Straight Connector 13"/>
+                <p:cNvCxnSpPr/>
+                <p:nvPr/>
+              </p:nvCxnSpPr>
+              <p:spPr>
+                <a:xfrm>
+                  <a:off x="4565269" y="3808964"/>
+                  <a:ext cx="684526" cy="0"/>
+                </a:xfrm>
+                <a:prstGeom prst="line">
+                  <a:avLst/>
+                </a:prstGeom>
+                <a:ln w="190500">
+                  <a:solidFill>
+                    <a:schemeClr val="tx1">
+                      <a:lumMod val="95000"/>
+                      <a:lumOff val="5000"/>
+                    </a:schemeClr>
+                  </a:solidFill>
+                </a:ln>
+              </p:spPr>
+              <p:style>
+                <a:lnRef idx="1">
+                  <a:schemeClr val="accent1"/>
+                </a:lnRef>
+                <a:fillRef idx="0">
+                  <a:schemeClr val="accent1"/>
+                </a:fillRef>
+                <a:effectRef idx="0">
+                  <a:schemeClr val="accent1"/>
+                </a:effectRef>
+                <a:fontRef idx="minor">
+                  <a:schemeClr val="tx1"/>
+                </a:fontRef>
+              </p:style>
+            </p:cxnSp>
+          </p:grpSp>
+          <p:cxnSp>
+            <p:nvCxnSpPr>
+              <p:cNvPr id="26" name="Straight Connector 25"/>
+              <p:cNvCxnSpPr/>
+              <p:nvPr/>
+            </p:nvCxnSpPr>
+            <p:spPr>
+              <a:xfrm>
+                <a:off x="5437338" y="3285435"/>
+                <a:ext cx="754865" cy="0"/>
+              </a:xfrm>
+              <a:prstGeom prst="line">
+                <a:avLst/>
+              </a:prstGeom>
+              <a:ln w="196850">
+                <a:solidFill>
+                  <a:schemeClr val="tx1">
+                    <a:lumMod val="95000"/>
+                    <a:lumOff val="5000"/>
+                  </a:schemeClr>
+                </a:solidFill>
+              </a:ln>
+            </p:spPr>
+            <p:style>
+              <a:lnRef idx="1">
+                <a:schemeClr val="accent1"/>
+              </a:lnRef>
+              <a:fillRef idx="0">
+                <a:schemeClr val="accent1"/>
+              </a:fillRef>
+              <a:effectRef idx="0">
+                <a:schemeClr val="accent1"/>
+              </a:effectRef>
+              <a:fontRef idx="minor">
+                <a:schemeClr val="tx1"/>
+              </a:fontRef>
+            </p:style>
+          </p:cxnSp>
+        </p:grpSp>
+        <p:cxnSp>
+          <p:nvCxnSpPr>
+            <p:cNvPr id="41" name="Straight Connector 40"/>
+            <p:cNvCxnSpPr/>
+            <p:nvPr/>
+          </p:nvCxnSpPr>
+          <p:spPr>
+            <a:xfrm>
+              <a:off x="6192203" y="4910752"/>
+              <a:ext cx="754865" cy="0"/>
+            </a:xfrm>
+            <a:prstGeom prst="line">
+              <a:avLst/>
+            </a:prstGeom>
+            <a:ln w="196850">
+              <a:solidFill>
+                <a:schemeClr val="tx1">
+                  <a:lumMod val="95000"/>
+                  <a:lumOff val="5000"/>
+                </a:schemeClr>
+              </a:solidFill>
+            </a:ln>
+          </p:spPr>
+          <p:style>
+            <a:lnRef idx="1">
+              <a:schemeClr val="accent1"/>
+            </a:lnRef>
+            <a:fillRef idx="0">
+              <a:schemeClr val="accent1"/>
+            </a:fillRef>
+            <a:effectRef idx="0">
+              <a:schemeClr val="accent1"/>
+            </a:effectRef>
+            <a:fontRef idx="minor">
+              <a:schemeClr val="tx1"/>
+            </a:fontRef>
+          </p:style>
+        </p:cxnSp>
+      </p:grpSp>
+      <p:grpSp>
+        <p:nvGrpSpPr>
+          <p:cNvPr id="44" name="Group 43"/>
+          <p:cNvGrpSpPr/>
+          <p:nvPr/>
+        </p:nvGrpSpPr>
+        <p:grpSpPr>
+          <a:xfrm>
+            <a:off x="8419927" y="2583117"/>
+            <a:ext cx="3377477" cy="3170195"/>
+            <a:chOff x="8419927" y="2583117"/>
+            <a:chExt cx="3377477" cy="3170195"/>
+          </a:xfrm>
+        </p:grpSpPr>
+        <p:grpSp>
+          <p:nvGrpSpPr>
+            <p:cNvPr id="31" name="Group 30"/>
+            <p:cNvGrpSpPr/>
+            <p:nvPr/>
+          </p:nvGrpSpPr>
+          <p:grpSpPr>
+            <a:xfrm>
+              <a:off x="8419927" y="2583117"/>
+              <a:ext cx="3377477" cy="3170195"/>
+              <a:chOff x="8419927" y="2583117"/>
+              <a:chExt cx="3377477" cy="3170195"/>
+            </a:xfrm>
+          </p:grpSpPr>
+          <p:pic>
+            <p:nvPicPr>
+              <p:cNvPr id="3" name="Picture 2"/>
+              <p:cNvPicPr>
+                <a:picLocks noChangeAspect="1"/>
+              </p:cNvPicPr>
+              <p:nvPr/>
+            </p:nvPicPr>
+            <p:blipFill>
+              <a:blip r:embed="rId2">
+                <a:extLst>
+                  <a:ext uri="{28A0092B-C50C-407E-A947-70E740481C1C}">
+                    <a14:useLocalDpi xmlns:a14="http://schemas.microsoft.com/office/drawing/2010/main" val="0"/>
+                  </a:ext>
+                </a:extLst>
+              </a:blip>
+              <a:stretch>
+                <a:fillRect/>
+              </a:stretch>
+            </p:blipFill>
+            <p:spPr>
+              <a:xfrm>
+                <a:off x="8419927" y="2583117"/>
+                <a:ext cx="3377477" cy="3170195"/>
+              </a:xfrm>
+              <a:prstGeom prst="rect">
+                <a:avLst/>
+              </a:prstGeom>
+            </p:spPr>
+          </p:pic>
+          <p:cxnSp>
+            <p:nvCxnSpPr>
+              <p:cNvPr id="29" name="Straight Connector 28"/>
+              <p:cNvCxnSpPr/>
+              <p:nvPr/>
+            </p:nvCxnSpPr>
+            <p:spPr>
+              <a:xfrm>
+                <a:off x="10532162" y="3274863"/>
+                <a:ext cx="684526" cy="0"/>
+              </a:xfrm>
+              <a:prstGeom prst="line">
+                <a:avLst/>
+              </a:prstGeom>
+              <a:ln w="193675">
+                <a:solidFill>
+                  <a:schemeClr val="tx1">
+                    <a:lumMod val="95000"/>
+                    <a:lumOff val="5000"/>
+                  </a:schemeClr>
+                </a:solidFill>
+              </a:ln>
+            </p:spPr>
+            <p:style>
+              <a:lnRef idx="1">
+                <a:schemeClr val="accent1"/>
+              </a:lnRef>
+              <a:fillRef idx="0">
+                <a:schemeClr val="accent1"/>
+              </a:fillRef>
+              <a:effectRef idx="0">
+                <a:schemeClr val="accent1"/>
+              </a:effectRef>
+              <a:fontRef idx="minor">
+                <a:schemeClr val="tx1"/>
+              </a:fontRef>
+            </p:style>
+          </p:cxnSp>
+          <p:cxnSp>
+            <p:nvCxnSpPr>
+              <p:cNvPr id="30" name="Straight Connector 29"/>
+              <p:cNvCxnSpPr/>
+              <p:nvPr/>
+            </p:nvCxnSpPr>
+            <p:spPr>
+              <a:xfrm>
+                <a:off x="9074282" y="3285435"/>
+                <a:ext cx="754865" cy="0"/>
+              </a:xfrm>
+              <a:prstGeom prst="line">
+                <a:avLst/>
+              </a:prstGeom>
+              <a:ln w="196850">
+                <a:solidFill>
+                  <a:schemeClr val="tx1">
+                    <a:lumMod val="95000"/>
+                    <a:lumOff val="5000"/>
+                  </a:schemeClr>
+                </a:solidFill>
+              </a:ln>
+            </p:spPr>
+            <p:style>
+              <a:lnRef idx="1">
+                <a:schemeClr val="accent1"/>
+              </a:lnRef>
+              <a:fillRef idx="0">
+                <a:schemeClr val="accent1"/>
+              </a:fillRef>
+              <a:effectRef idx="0">
+                <a:schemeClr val="accent1"/>
+              </a:effectRef>
+              <a:fontRef idx="minor">
+                <a:schemeClr val="tx1"/>
+              </a:fontRef>
+            </p:style>
+          </p:cxnSp>
+        </p:grpSp>
+        <p:cxnSp>
+          <p:nvCxnSpPr>
+            <p:cNvPr id="43" name="Straight Connector 42"/>
+            <p:cNvCxnSpPr/>
+            <p:nvPr/>
+          </p:nvCxnSpPr>
+          <p:spPr>
+            <a:xfrm>
+              <a:off x="9829147" y="4902001"/>
+              <a:ext cx="754865" cy="0"/>
+            </a:xfrm>
+            <a:prstGeom prst="line">
+              <a:avLst/>
+            </a:prstGeom>
+            <a:ln w="196850">
+              <a:solidFill>
+                <a:schemeClr val="tx1">
+                  <a:lumMod val="95000"/>
+                  <a:lumOff val="5000"/>
+                </a:schemeClr>
+              </a:solidFill>
+            </a:ln>
+          </p:spPr>
+          <p:style>
+            <a:lnRef idx="1">
+              <a:schemeClr val="accent1"/>
+            </a:lnRef>
+            <a:fillRef idx="0">
+              <a:schemeClr val="accent1"/>
+            </a:fillRef>
+            <a:effectRef idx="0">
+              <a:schemeClr val="accent1"/>
+            </a:effectRef>
+            <a:fontRef idx="minor">
+              <a:schemeClr val="tx1"/>
+            </a:fontRef>
+          </p:style>
+        </p:cxnSp>
+      </p:grpSp>
     </p:spTree>
     <p:extLst>
       <p:ext uri="{BB962C8B-B14F-4D97-AF65-F5344CB8AC3E}">
@@ -3109,6 +3577,1920 @@
   <p:clrMapOvr>
     <a:masterClrMapping/>
   </p:clrMapOvr>
+  <p:timing>
+    <p:tnLst>
+      <p:par>
+        <p:cTn id="1" dur="indefinite" restart="never" nodeType="tmRoot"/>
+      </p:par>
+    </p:tnLst>
+  </p:timing>
+</p:sld>
+</file>
+
+<file path=ppt/slides/slide2.xml><?xml version="1.0" encoding="utf-8"?>
+<p:sld xmlns:a="http://schemas.openxmlformats.org/drawingml/2006/main" xmlns:r="http://schemas.openxmlformats.org/officeDocument/2006/relationships" xmlns:p="http://schemas.openxmlformats.org/presentationml/2006/main">
+  <p:cSld>
+    <p:spTree>
+      <p:nvGrpSpPr>
+        <p:cNvPr id="1" name=""/>
+        <p:cNvGrpSpPr/>
+        <p:nvPr/>
+      </p:nvGrpSpPr>
+      <p:grpSpPr>
+        <a:xfrm>
+          <a:off x="0" y="0"/>
+          <a:ext cx="0" cy="0"/>
+          <a:chOff x="0" y="0"/>
+          <a:chExt cx="0" cy="0"/>
+        </a:xfrm>
+      </p:grpSpPr>
+      <p:grpSp>
+        <p:nvGrpSpPr>
+          <p:cNvPr id="15" name="Group 14"/>
+          <p:cNvGrpSpPr/>
+          <p:nvPr/>
+        </p:nvGrpSpPr>
+        <p:grpSpPr>
+          <a:xfrm>
+            <a:off x="386422" y="135338"/>
+            <a:ext cx="3377477" cy="3170195"/>
+            <a:chOff x="1244551" y="1471769"/>
+            <a:chExt cx="3377477" cy="3170195"/>
+          </a:xfrm>
+        </p:grpSpPr>
+        <p:grpSp>
+          <p:nvGrpSpPr>
+            <p:cNvPr id="4" name="Group 3"/>
+            <p:cNvGrpSpPr/>
+            <p:nvPr/>
+          </p:nvGrpSpPr>
+          <p:grpSpPr>
+            <a:xfrm>
+              <a:off x="1244551" y="1471769"/>
+              <a:ext cx="3377477" cy="3170195"/>
+              <a:chOff x="4803677" y="2583117"/>
+              <a:chExt cx="3377477" cy="3170195"/>
+            </a:xfrm>
+          </p:grpSpPr>
+          <p:grpSp>
+            <p:nvGrpSpPr>
+              <p:cNvPr id="7" name="Group 6"/>
+              <p:cNvGrpSpPr/>
+              <p:nvPr/>
+            </p:nvGrpSpPr>
+            <p:grpSpPr>
+              <a:xfrm>
+                <a:off x="4803677" y="2583117"/>
+                <a:ext cx="3377477" cy="3170195"/>
+                <a:chOff x="2426365" y="3126743"/>
+                <a:chExt cx="3377477" cy="3170195"/>
+              </a:xfrm>
+            </p:grpSpPr>
+            <p:pic>
+              <p:nvPicPr>
+                <p:cNvPr id="9" name="Picture 8"/>
+                <p:cNvPicPr>
+                  <a:picLocks noChangeAspect="1"/>
+                </p:cNvPicPr>
+                <p:nvPr/>
+              </p:nvPicPr>
+              <p:blipFill>
+                <a:blip r:embed="rId2">
+                  <a:extLst>
+                    <a:ext uri="{28A0092B-C50C-407E-A947-70E740481C1C}">
+                      <a14:useLocalDpi xmlns:a14="http://schemas.microsoft.com/office/drawing/2010/main" val="0"/>
+                    </a:ext>
+                  </a:extLst>
+                </a:blip>
+                <a:stretch>
+                  <a:fillRect/>
+                </a:stretch>
+              </p:blipFill>
+              <p:spPr>
+                <a:xfrm>
+                  <a:off x="2426365" y="3126743"/>
+                  <a:ext cx="3377477" cy="3170195"/>
+                </a:xfrm>
+                <a:prstGeom prst="rect">
+                  <a:avLst/>
+                </a:prstGeom>
+              </p:spPr>
+            </p:pic>
+            <p:cxnSp>
+              <p:nvCxnSpPr>
+                <p:cNvPr id="10" name="Straight Connector 9"/>
+                <p:cNvCxnSpPr/>
+                <p:nvPr/>
+              </p:nvCxnSpPr>
+              <p:spPr>
+                <a:xfrm>
+                  <a:off x="4565269" y="3808964"/>
+                  <a:ext cx="684526" cy="0"/>
+                </a:xfrm>
+                <a:prstGeom prst="line">
+                  <a:avLst/>
+                </a:prstGeom>
+                <a:ln w="190500">
+                  <a:solidFill>
+                    <a:schemeClr val="tx1">
+                      <a:lumMod val="95000"/>
+                      <a:lumOff val="5000"/>
+                    </a:schemeClr>
+                  </a:solidFill>
+                </a:ln>
+              </p:spPr>
+              <p:style>
+                <a:lnRef idx="1">
+                  <a:schemeClr val="accent1"/>
+                </a:lnRef>
+                <a:fillRef idx="0">
+                  <a:schemeClr val="accent1"/>
+                </a:fillRef>
+                <a:effectRef idx="0">
+                  <a:schemeClr val="accent1"/>
+                </a:effectRef>
+                <a:fontRef idx="minor">
+                  <a:schemeClr val="tx1"/>
+                </a:fontRef>
+              </p:style>
+            </p:cxnSp>
+          </p:grpSp>
+          <p:cxnSp>
+            <p:nvCxnSpPr>
+              <p:cNvPr id="6" name="Straight Connector 5"/>
+              <p:cNvCxnSpPr/>
+              <p:nvPr/>
+            </p:nvCxnSpPr>
+            <p:spPr>
+              <a:xfrm>
+                <a:off x="5437338" y="3285435"/>
+                <a:ext cx="754865" cy="0"/>
+              </a:xfrm>
+              <a:prstGeom prst="line">
+                <a:avLst/>
+              </a:prstGeom>
+              <a:ln w="196850">
+                <a:solidFill>
+                  <a:schemeClr val="tx1">
+                    <a:lumMod val="95000"/>
+                    <a:lumOff val="5000"/>
+                  </a:schemeClr>
+                </a:solidFill>
+              </a:ln>
+            </p:spPr>
+            <p:style>
+              <a:lnRef idx="1">
+                <a:schemeClr val="accent1"/>
+              </a:lnRef>
+              <a:fillRef idx="0">
+                <a:schemeClr val="accent1"/>
+              </a:fillRef>
+              <a:effectRef idx="0">
+                <a:schemeClr val="accent1"/>
+              </a:effectRef>
+              <a:fontRef idx="minor">
+                <a:schemeClr val="tx1"/>
+              </a:fontRef>
+            </p:style>
+          </p:cxnSp>
+        </p:grpSp>
+        <p:cxnSp>
+          <p:nvCxnSpPr>
+            <p:cNvPr id="13" name="Straight Connector 12"/>
+            <p:cNvCxnSpPr/>
+            <p:nvPr/>
+          </p:nvCxnSpPr>
+          <p:spPr>
+            <a:xfrm>
+              <a:off x="2633077" y="3676985"/>
+              <a:ext cx="754865" cy="0"/>
+            </a:xfrm>
+            <a:prstGeom prst="line">
+              <a:avLst/>
+            </a:prstGeom>
+            <a:ln w="196850">
+              <a:solidFill>
+                <a:schemeClr val="tx1">
+                  <a:lumMod val="95000"/>
+                  <a:lumOff val="5000"/>
+                </a:schemeClr>
+              </a:solidFill>
+            </a:ln>
+          </p:spPr>
+          <p:style>
+            <a:lnRef idx="1">
+              <a:schemeClr val="accent1"/>
+            </a:lnRef>
+            <a:fillRef idx="0">
+              <a:schemeClr val="accent1"/>
+            </a:fillRef>
+            <a:effectRef idx="0">
+              <a:schemeClr val="accent1"/>
+            </a:effectRef>
+            <a:fontRef idx="minor">
+              <a:schemeClr val="tx1"/>
+            </a:fontRef>
+          </p:style>
+        </p:cxnSp>
+      </p:grpSp>
+      <p:grpSp>
+        <p:nvGrpSpPr>
+          <p:cNvPr id="53" name="Group 52"/>
+          <p:cNvGrpSpPr/>
+          <p:nvPr/>
+        </p:nvGrpSpPr>
+        <p:grpSpPr>
+          <a:xfrm>
+            <a:off x="2867589" y="3020318"/>
+            <a:ext cx="3377477" cy="3170195"/>
+            <a:chOff x="2867589" y="3020318"/>
+            <a:chExt cx="3377477" cy="3170195"/>
+          </a:xfrm>
+        </p:grpSpPr>
+        <p:grpSp>
+          <p:nvGrpSpPr>
+            <p:cNvPr id="51" name="Group 50"/>
+            <p:cNvGrpSpPr/>
+            <p:nvPr/>
+          </p:nvGrpSpPr>
+          <p:grpSpPr>
+            <a:xfrm>
+              <a:off x="2867589" y="3020318"/>
+              <a:ext cx="3377477" cy="3170195"/>
+              <a:chOff x="2979978" y="2006341"/>
+              <a:chExt cx="3377477" cy="3170195"/>
+            </a:xfrm>
+          </p:grpSpPr>
+          <p:grpSp>
+            <p:nvGrpSpPr>
+              <p:cNvPr id="27" name="Group 26"/>
+              <p:cNvGrpSpPr/>
+              <p:nvPr/>
+            </p:nvGrpSpPr>
+            <p:grpSpPr>
+              <a:xfrm>
+                <a:off x="2979978" y="2006341"/>
+                <a:ext cx="3377477" cy="3170195"/>
+                <a:chOff x="4299290" y="2794507"/>
+                <a:chExt cx="3377477" cy="3170195"/>
+              </a:xfrm>
+            </p:grpSpPr>
+            <p:pic>
+              <p:nvPicPr>
+                <p:cNvPr id="31" name="Picture 30"/>
+                <p:cNvPicPr>
+                  <a:picLocks noChangeAspect="1"/>
+                </p:cNvPicPr>
+                <p:nvPr/>
+              </p:nvPicPr>
+              <p:blipFill>
+                <a:blip r:embed="rId2">
+                  <a:extLst>
+                    <a:ext uri="{28A0092B-C50C-407E-A947-70E740481C1C}">
+                      <a14:useLocalDpi xmlns:a14="http://schemas.microsoft.com/office/drawing/2010/main" val="0"/>
+                    </a:ext>
+                  </a:extLst>
+                </a:blip>
+                <a:stretch>
+                  <a:fillRect/>
+                </a:stretch>
+              </p:blipFill>
+              <p:spPr>
+                <a:xfrm>
+                  <a:off x="4299290" y="2794507"/>
+                  <a:ext cx="3377477" cy="3170195"/>
+                </a:xfrm>
+                <a:prstGeom prst="rect">
+                  <a:avLst/>
+                </a:prstGeom>
+              </p:spPr>
+            </p:pic>
+            <p:sp>
+              <p:nvSpPr>
+                <p:cNvPr id="30" name="Freeform 29"/>
+                <p:cNvSpPr/>
+                <p:nvPr/>
+              </p:nvSpPr>
+              <p:spPr>
+                <a:xfrm>
+                  <a:off x="5143966" y="4722704"/>
+                  <a:ext cx="1688123" cy="422031"/>
+                </a:xfrm>
+                <a:custGeom>
+                  <a:avLst/>
+                  <a:gdLst>
+                    <a:gd name="connsiteX0" fmla="*/ 0 w 1688123"/>
+                    <a:gd name="connsiteY0" fmla="*/ 309490 h 422031"/>
+                    <a:gd name="connsiteX1" fmla="*/ 28135 w 1688123"/>
+                    <a:gd name="connsiteY1" fmla="*/ 168813 h 422031"/>
+                    <a:gd name="connsiteX2" fmla="*/ 42203 w 1688123"/>
+                    <a:gd name="connsiteY2" fmla="*/ 126610 h 422031"/>
+                    <a:gd name="connsiteX3" fmla="*/ 70338 w 1688123"/>
+                    <a:gd name="connsiteY3" fmla="*/ 98474 h 422031"/>
+                    <a:gd name="connsiteX4" fmla="*/ 154744 w 1688123"/>
+                    <a:gd name="connsiteY4" fmla="*/ 70339 h 422031"/>
+                    <a:gd name="connsiteX5" fmla="*/ 253218 w 1688123"/>
+                    <a:gd name="connsiteY5" fmla="*/ 112542 h 422031"/>
+                    <a:gd name="connsiteX6" fmla="*/ 281353 w 1688123"/>
+                    <a:gd name="connsiteY6" fmla="*/ 196948 h 422031"/>
+                    <a:gd name="connsiteX7" fmla="*/ 309489 w 1688123"/>
+                    <a:gd name="connsiteY7" fmla="*/ 295422 h 422031"/>
+                    <a:gd name="connsiteX8" fmla="*/ 323557 w 1688123"/>
+                    <a:gd name="connsiteY8" fmla="*/ 337625 h 422031"/>
+                    <a:gd name="connsiteX9" fmla="*/ 365760 w 1688123"/>
+                    <a:gd name="connsiteY9" fmla="*/ 365760 h 422031"/>
+                    <a:gd name="connsiteX10" fmla="*/ 422030 w 1688123"/>
+                    <a:gd name="connsiteY10" fmla="*/ 351693 h 422031"/>
+                    <a:gd name="connsiteX11" fmla="*/ 478301 w 1688123"/>
+                    <a:gd name="connsiteY11" fmla="*/ 281354 h 422031"/>
+                    <a:gd name="connsiteX12" fmla="*/ 506437 w 1688123"/>
+                    <a:gd name="connsiteY12" fmla="*/ 253219 h 422031"/>
+                    <a:gd name="connsiteX13" fmla="*/ 548640 w 1688123"/>
+                    <a:gd name="connsiteY13" fmla="*/ 182880 h 422031"/>
+                    <a:gd name="connsiteX14" fmla="*/ 590843 w 1688123"/>
+                    <a:gd name="connsiteY14" fmla="*/ 112542 h 422031"/>
+                    <a:gd name="connsiteX15" fmla="*/ 647113 w 1688123"/>
+                    <a:gd name="connsiteY15" fmla="*/ 0 h 422031"/>
+                    <a:gd name="connsiteX16" fmla="*/ 731520 w 1688123"/>
+                    <a:gd name="connsiteY16" fmla="*/ 14068 h 422031"/>
+                    <a:gd name="connsiteX17" fmla="*/ 773723 w 1688123"/>
+                    <a:gd name="connsiteY17" fmla="*/ 140677 h 422031"/>
+                    <a:gd name="connsiteX18" fmla="*/ 787790 w 1688123"/>
+                    <a:gd name="connsiteY18" fmla="*/ 295422 h 422031"/>
+                    <a:gd name="connsiteX19" fmla="*/ 801858 w 1688123"/>
+                    <a:gd name="connsiteY19" fmla="*/ 337625 h 422031"/>
+                    <a:gd name="connsiteX20" fmla="*/ 844061 w 1688123"/>
+                    <a:gd name="connsiteY20" fmla="*/ 365760 h 422031"/>
+                    <a:gd name="connsiteX21" fmla="*/ 872197 w 1688123"/>
+                    <a:gd name="connsiteY21" fmla="*/ 393896 h 422031"/>
+                    <a:gd name="connsiteX22" fmla="*/ 956603 w 1688123"/>
+                    <a:gd name="connsiteY22" fmla="*/ 422031 h 422031"/>
+                    <a:gd name="connsiteX23" fmla="*/ 998806 w 1688123"/>
+                    <a:gd name="connsiteY23" fmla="*/ 351693 h 422031"/>
+                    <a:gd name="connsiteX24" fmla="*/ 1012873 w 1688123"/>
+                    <a:gd name="connsiteY24" fmla="*/ 309490 h 422031"/>
+                    <a:gd name="connsiteX25" fmla="*/ 1041009 w 1688123"/>
+                    <a:gd name="connsiteY25" fmla="*/ 281354 h 422031"/>
+                    <a:gd name="connsiteX26" fmla="*/ 1097280 w 1688123"/>
+                    <a:gd name="connsiteY26" fmla="*/ 211016 h 422031"/>
+                    <a:gd name="connsiteX27" fmla="*/ 1111347 w 1688123"/>
+                    <a:gd name="connsiteY27" fmla="*/ 168813 h 422031"/>
+                    <a:gd name="connsiteX28" fmla="*/ 1181686 w 1688123"/>
+                    <a:gd name="connsiteY28" fmla="*/ 112542 h 422031"/>
+                    <a:gd name="connsiteX29" fmla="*/ 1195753 w 1688123"/>
+                    <a:gd name="connsiteY29" fmla="*/ 70339 h 422031"/>
+                    <a:gd name="connsiteX30" fmla="*/ 1266092 w 1688123"/>
+                    <a:gd name="connsiteY30" fmla="*/ 28136 h 422031"/>
+                    <a:gd name="connsiteX31" fmla="*/ 1294227 w 1688123"/>
+                    <a:gd name="connsiteY31" fmla="*/ 70339 h 422031"/>
+                    <a:gd name="connsiteX32" fmla="*/ 1322363 w 1688123"/>
+                    <a:gd name="connsiteY32" fmla="*/ 154745 h 422031"/>
+                    <a:gd name="connsiteX33" fmla="*/ 1336430 w 1688123"/>
+                    <a:gd name="connsiteY33" fmla="*/ 351693 h 422031"/>
+                    <a:gd name="connsiteX34" fmla="*/ 1350498 w 1688123"/>
+                    <a:gd name="connsiteY34" fmla="*/ 393896 h 422031"/>
+                    <a:gd name="connsiteX35" fmla="*/ 1434904 w 1688123"/>
+                    <a:gd name="connsiteY35" fmla="*/ 422031 h 422031"/>
+                    <a:gd name="connsiteX36" fmla="*/ 1491175 w 1688123"/>
+                    <a:gd name="connsiteY36" fmla="*/ 407964 h 422031"/>
+                    <a:gd name="connsiteX37" fmla="*/ 1547446 w 1688123"/>
+                    <a:gd name="connsiteY37" fmla="*/ 351693 h 422031"/>
+                    <a:gd name="connsiteX38" fmla="*/ 1561513 w 1688123"/>
+                    <a:gd name="connsiteY38" fmla="*/ 309490 h 422031"/>
+                    <a:gd name="connsiteX39" fmla="*/ 1589649 w 1688123"/>
+                    <a:gd name="connsiteY39" fmla="*/ 281354 h 422031"/>
+                    <a:gd name="connsiteX40" fmla="*/ 1645920 w 1688123"/>
+                    <a:gd name="connsiteY40" fmla="*/ 168813 h 422031"/>
+                    <a:gd name="connsiteX41" fmla="*/ 1688123 w 1688123"/>
+                    <a:gd name="connsiteY41" fmla="*/ 56271 h 422031"/>
+                  </a:gdLst>
+                  <a:ahLst/>
+                  <a:cxnLst>
+                    <a:cxn ang="0">
+                      <a:pos x="connsiteX0" y="connsiteY0"/>
+                    </a:cxn>
+                    <a:cxn ang="0">
+                      <a:pos x="connsiteX1" y="connsiteY1"/>
+                    </a:cxn>
+                    <a:cxn ang="0">
+                      <a:pos x="connsiteX2" y="connsiteY2"/>
+                    </a:cxn>
+                    <a:cxn ang="0">
+                      <a:pos x="connsiteX3" y="connsiteY3"/>
+                    </a:cxn>
+                    <a:cxn ang="0">
+                      <a:pos x="connsiteX4" y="connsiteY4"/>
+                    </a:cxn>
+                    <a:cxn ang="0">
+                      <a:pos x="connsiteX5" y="connsiteY5"/>
+                    </a:cxn>
+                    <a:cxn ang="0">
+                      <a:pos x="connsiteX6" y="connsiteY6"/>
+                    </a:cxn>
+                    <a:cxn ang="0">
+                      <a:pos x="connsiteX7" y="connsiteY7"/>
+                    </a:cxn>
+                    <a:cxn ang="0">
+                      <a:pos x="connsiteX8" y="connsiteY8"/>
+                    </a:cxn>
+                    <a:cxn ang="0">
+                      <a:pos x="connsiteX9" y="connsiteY9"/>
+                    </a:cxn>
+                    <a:cxn ang="0">
+                      <a:pos x="connsiteX10" y="connsiteY10"/>
+                    </a:cxn>
+                    <a:cxn ang="0">
+                      <a:pos x="connsiteX11" y="connsiteY11"/>
+                    </a:cxn>
+                    <a:cxn ang="0">
+                      <a:pos x="connsiteX12" y="connsiteY12"/>
+                    </a:cxn>
+                    <a:cxn ang="0">
+                      <a:pos x="connsiteX13" y="connsiteY13"/>
+                    </a:cxn>
+                    <a:cxn ang="0">
+                      <a:pos x="connsiteX14" y="connsiteY14"/>
+                    </a:cxn>
+                    <a:cxn ang="0">
+                      <a:pos x="connsiteX15" y="connsiteY15"/>
+                    </a:cxn>
+                    <a:cxn ang="0">
+                      <a:pos x="connsiteX16" y="connsiteY16"/>
+                    </a:cxn>
+                    <a:cxn ang="0">
+                      <a:pos x="connsiteX17" y="connsiteY17"/>
+                    </a:cxn>
+                    <a:cxn ang="0">
+                      <a:pos x="connsiteX18" y="connsiteY18"/>
+                    </a:cxn>
+                    <a:cxn ang="0">
+                      <a:pos x="connsiteX19" y="connsiteY19"/>
+                    </a:cxn>
+                    <a:cxn ang="0">
+                      <a:pos x="connsiteX20" y="connsiteY20"/>
+                    </a:cxn>
+                    <a:cxn ang="0">
+                      <a:pos x="connsiteX21" y="connsiteY21"/>
+                    </a:cxn>
+                    <a:cxn ang="0">
+                      <a:pos x="connsiteX22" y="connsiteY22"/>
+                    </a:cxn>
+                    <a:cxn ang="0">
+                      <a:pos x="connsiteX23" y="connsiteY23"/>
+                    </a:cxn>
+                    <a:cxn ang="0">
+                      <a:pos x="connsiteX24" y="connsiteY24"/>
+                    </a:cxn>
+                    <a:cxn ang="0">
+                      <a:pos x="connsiteX25" y="connsiteY25"/>
+                    </a:cxn>
+                    <a:cxn ang="0">
+                      <a:pos x="connsiteX26" y="connsiteY26"/>
+                    </a:cxn>
+                    <a:cxn ang="0">
+                      <a:pos x="connsiteX27" y="connsiteY27"/>
+                    </a:cxn>
+                    <a:cxn ang="0">
+                      <a:pos x="connsiteX28" y="connsiteY28"/>
+                    </a:cxn>
+                    <a:cxn ang="0">
+                      <a:pos x="connsiteX29" y="connsiteY29"/>
+                    </a:cxn>
+                    <a:cxn ang="0">
+                      <a:pos x="connsiteX30" y="connsiteY30"/>
+                    </a:cxn>
+                    <a:cxn ang="0">
+                      <a:pos x="connsiteX31" y="connsiteY31"/>
+                    </a:cxn>
+                    <a:cxn ang="0">
+                      <a:pos x="connsiteX32" y="connsiteY32"/>
+                    </a:cxn>
+                    <a:cxn ang="0">
+                      <a:pos x="connsiteX33" y="connsiteY33"/>
+                    </a:cxn>
+                    <a:cxn ang="0">
+                      <a:pos x="connsiteX34" y="connsiteY34"/>
+                    </a:cxn>
+                    <a:cxn ang="0">
+                      <a:pos x="connsiteX35" y="connsiteY35"/>
+                    </a:cxn>
+                    <a:cxn ang="0">
+                      <a:pos x="connsiteX36" y="connsiteY36"/>
+                    </a:cxn>
+                    <a:cxn ang="0">
+                      <a:pos x="connsiteX37" y="connsiteY37"/>
+                    </a:cxn>
+                    <a:cxn ang="0">
+                      <a:pos x="connsiteX38" y="connsiteY38"/>
+                    </a:cxn>
+                    <a:cxn ang="0">
+                      <a:pos x="connsiteX39" y="connsiteY39"/>
+                    </a:cxn>
+                    <a:cxn ang="0">
+                      <a:pos x="connsiteX40" y="connsiteY40"/>
+                    </a:cxn>
+                    <a:cxn ang="0">
+                      <a:pos x="connsiteX41" y="connsiteY41"/>
+                    </a:cxn>
+                  </a:cxnLst>
+                  <a:rect l="l" t="t" r="r" b="b"/>
+                  <a:pathLst>
+                    <a:path w="1688123" h="422031">
+                      <a:moveTo>
+                        <a:pt x="0" y="309490"/>
+                      </a:moveTo>
+                      <a:cubicBezTo>
+                        <a:pt x="9378" y="262598"/>
+                        <a:pt x="13012" y="214180"/>
+                        <a:pt x="28135" y="168813"/>
+                      </a:cubicBezTo>
+                      <a:cubicBezTo>
+                        <a:pt x="32824" y="154745"/>
+                        <a:pt x="34574" y="139326"/>
+                        <a:pt x="42203" y="126610"/>
+                      </a:cubicBezTo>
+                      <a:cubicBezTo>
+                        <a:pt x="49027" y="115237"/>
+                        <a:pt x="58475" y="104406"/>
+                        <a:pt x="70338" y="98474"/>
+                      </a:cubicBezTo>
+                      <a:cubicBezTo>
+                        <a:pt x="96864" y="85211"/>
+                        <a:pt x="154744" y="70339"/>
+                        <a:pt x="154744" y="70339"/>
+                      </a:cubicBezTo>
+                      <a:cubicBezTo>
+                        <a:pt x="181332" y="76986"/>
+                        <a:pt x="235228" y="83758"/>
+                        <a:pt x="253218" y="112542"/>
+                      </a:cubicBezTo>
+                      <a:cubicBezTo>
+                        <a:pt x="268936" y="137691"/>
+                        <a:pt x="271975" y="168813"/>
+                        <a:pt x="281353" y="196948"/>
+                      </a:cubicBezTo>
+                      <a:cubicBezTo>
+                        <a:pt x="315088" y="298153"/>
+                        <a:pt x="274154" y="171751"/>
+                        <a:pt x="309489" y="295422"/>
+                      </a:cubicBezTo>
+                      <a:cubicBezTo>
+                        <a:pt x="313563" y="309680"/>
+                        <a:pt x="314294" y="326046"/>
+                        <a:pt x="323557" y="337625"/>
+                      </a:cubicBezTo>
+                      <a:cubicBezTo>
+                        <a:pt x="334119" y="350827"/>
+                        <a:pt x="351692" y="356382"/>
+                        <a:pt x="365760" y="365760"/>
+                      </a:cubicBezTo>
+                      <a:cubicBezTo>
+                        <a:pt x="384517" y="361071"/>
+                        <a:pt x="404737" y="360339"/>
+                        <a:pt x="422030" y="351693"/>
+                      </a:cubicBezTo>
+                      <a:cubicBezTo>
+                        <a:pt x="444676" y="340370"/>
+                        <a:pt x="465047" y="297921"/>
+                        <a:pt x="478301" y="281354"/>
+                      </a:cubicBezTo>
+                      <a:cubicBezTo>
+                        <a:pt x="486587" y="270997"/>
+                        <a:pt x="497058" y="262597"/>
+                        <a:pt x="506437" y="253219"/>
+                      </a:cubicBezTo>
+                      <a:cubicBezTo>
+                        <a:pt x="546286" y="133667"/>
+                        <a:pt x="490709" y="279432"/>
+                        <a:pt x="548640" y="182880"/>
+                      </a:cubicBezTo>
+                      <a:cubicBezTo>
+                        <a:pt x="603424" y="91573"/>
+                        <a:pt x="519554" y="183828"/>
+                        <a:pt x="590843" y="112542"/>
+                      </a:cubicBezTo>
+                      <a:cubicBezTo>
+                        <a:pt x="623172" y="15553"/>
+                        <a:pt x="598008" y="49107"/>
+                        <a:pt x="647113" y="0"/>
+                      </a:cubicBezTo>
+                      <a:cubicBezTo>
+                        <a:pt x="675249" y="4689"/>
+                        <a:pt x="704812" y="4052"/>
+                        <a:pt x="731520" y="14068"/>
+                      </a:cubicBezTo>
+                      <a:cubicBezTo>
+                        <a:pt x="777884" y="31455"/>
+                        <a:pt x="770821" y="114562"/>
+                        <a:pt x="773723" y="140677"/>
+                      </a:cubicBezTo>
+                      <a:cubicBezTo>
+                        <a:pt x="779443" y="192155"/>
+                        <a:pt x="780465" y="244148"/>
+                        <a:pt x="787790" y="295422"/>
+                      </a:cubicBezTo>
+                      <a:cubicBezTo>
+                        <a:pt x="789887" y="310102"/>
+                        <a:pt x="792595" y="326046"/>
+                        <a:pt x="801858" y="337625"/>
+                      </a:cubicBezTo>
+                      <a:cubicBezTo>
+                        <a:pt x="812420" y="350827"/>
+                        <a:pt x="830859" y="355198"/>
+                        <a:pt x="844061" y="365760"/>
+                      </a:cubicBezTo>
+                      <a:cubicBezTo>
+                        <a:pt x="854418" y="374046"/>
+                        <a:pt x="860334" y="387964"/>
+                        <a:pt x="872197" y="393896"/>
+                      </a:cubicBezTo>
+                      <a:cubicBezTo>
+                        <a:pt x="898723" y="407159"/>
+                        <a:pt x="956603" y="422031"/>
+                        <a:pt x="956603" y="422031"/>
+                      </a:cubicBezTo>
+                      <a:cubicBezTo>
+                        <a:pt x="996452" y="302477"/>
+                        <a:pt x="940875" y="448244"/>
+                        <a:pt x="998806" y="351693"/>
+                      </a:cubicBezTo>
+                      <a:cubicBezTo>
+                        <a:pt x="1006435" y="338978"/>
+                        <a:pt x="1005244" y="322205"/>
+                        <a:pt x="1012873" y="309490"/>
+                      </a:cubicBezTo>
+                      <a:cubicBezTo>
+                        <a:pt x="1019697" y="298117"/>
+                        <a:pt x="1032723" y="291711"/>
+                        <a:pt x="1041009" y="281354"/>
+                      </a:cubicBezTo>
+                      <a:cubicBezTo>
+                        <a:pt x="1111989" y="192628"/>
+                        <a:pt x="1029349" y="278945"/>
+                        <a:pt x="1097280" y="211016"/>
+                      </a:cubicBezTo>
+                      <a:cubicBezTo>
+                        <a:pt x="1101969" y="196948"/>
+                        <a:pt x="1103718" y="181528"/>
+                        <a:pt x="1111347" y="168813"/>
+                      </a:cubicBezTo>
+                      <a:cubicBezTo>
+                        <a:pt x="1124711" y="146540"/>
+                        <a:pt x="1162517" y="125321"/>
+                        <a:pt x="1181686" y="112542"/>
+                      </a:cubicBezTo>
+                      <a:cubicBezTo>
+                        <a:pt x="1186375" y="98474"/>
+                        <a:pt x="1188124" y="83054"/>
+                        <a:pt x="1195753" y="70339"/>
+                      </a:cubicBezTo>
+                      <a:cubicBezTo>
+                        <a:pt x="1215063" y="38156"/>
+                        <a:pt x="1232898" y="39201"/>
+                        <a:pt x="1266092" y="28136"/>
+                      </a:cubicBezTo>
+                      <a:cubicBezTo>
+                        <a:pt x="1275470" y="42204"/>
+                        <a:pt x="1287360" y="54889"/>
+                        <a:pt x="1294227" y="70339"/>
+                      </a:cubicBezTo>
+                      <a:cubicBezTo>
+                        <a:pt x="1306272" y="97440"/>
+                        <a:pt x="1322363" y="154745"/>
+                        <a:pt x="1322363" y="154745"/>
+                      </a:cubicBezTo>
+                      <a:cubicBezTo>
+                        <a:pt x="1327052" y="220394"/>
+                        <a:pt x="1328740" y="286327"/>
+                        <a:pt x="1336430" y="351693"/>
+                      </a:cubicBezTo>
+                      <a:cubicBezTo>
+                        <a:pt x="1338163" y="366420"/>
+                        <a:pt x="1338431" y="385277"/>
+                        <a:pt x="1350498" y="393896"/>
+                      </a:cubicBezTo>
+                      <a:cubicBezTo>
+                        <a:pt x="1374631" y="411134"/>
+                        <a:pt x="1434904" y="422031"/>
+                        <a:pt x="1434904" y="422031"/>
+                      </a:cubicBezTo>
+                      <a:cubicBezTo>
+                        <a:pt x="1453661" y="417342"/>
+                        <a:pt x="1474780" y="418211"/>
+                        <a:pt x="1491175" y="407964"/>
+                      </a:cubicBezTo>
+                      <a:cubicBezTo>
+                        <a:pt x="1513669" y="393905"/>
+                        <a:pt x="1547446" y="351693"/>
+                        <a:pt x="1547446" y="351693"/>
+                      </a:cubicBezTo>
+                      <a:cubicBezTo>
+                        <a:pt x="1552135" y="337625"/>
+                        <a:pt x="1553884" y="322205"/>
+                        <a:pt x="1561513" y="309490"/>
+                      </a:cubicBezTo>
+                      <a:cubicBezTo>
+                        <a:pt x="1568337" y="298117"/>
+                        <a:pt x="1583717" y="293217"/>
+                        <a:pt x="1589649" y="281354"/>
+                      </a:cubicBezTo>
+                      <a:cubicBezTo>
+                        <a:pt x="1654307" y="152037"/>
+                        <a:pt x="1582355" y="232376"/>
+                        <a:pt x="1645920" y="168813"/>
+                      </a:cubicBezTo>
+                      <a:cubicBezTo>
+                        <a:pt x="1677371" y="74459"/>
+                        <a:pt x="1660792" y="110933"/>
+                        <a:pt x="1688123" y="56271"/>
+                      </a:cubicBezTo>
+                    </a:path>
+                  </a:pathLst>
+                </a:custGeom>
+                <a:noFill/>
+                <a:ln w="130175">
+                  <a:solidFill>
+                    <a:schemeClr val="tx1">
+                      <a:lumMod val="95000"/>
+                      <a:lumOff val="5000"/>
+                    </a:schemeClr>
+                  </a:solidFill>
+                </a:ln>
+              </p:spPr>
+              <p:style>
+                <a:lnRef idx="2">
+                  <a:schemeClr val="accent1">
+                    <a:shade val="50000"/>
+                  </a:schemeClr>
+                </a:lnRef>
+                <a:fillRef idx="1">
+                  <a:schemeClr val="accent1"/>
+                </a:fillRef>
+                <a:effectRef idx="0">
+                  <a:schemeClr val="accent1"/>
+                </a:effectRef>
+                <a:fontRef idx="minor">
+                  <a:schemeClr val="lt1"/>
+                </a:fontRef>
+              </p:style>
+              <p:txBody>
+                <a:bodyPr rtlCol="0" anchor="ctr"/>
+                <a:lstStyle/>
+                <a:p>
+                  <a:pPr algn="ctr"/>
+                  <a:endParaRPr lang="en-US"/>
+                </a:p>
+              </p:txBody>
+            </p:sp>
+          </p:grpSp>
+          <p:sp>
+            <p:nvSpPr>
+              <p:cNvPr id="50" name="Chevron 49"/>
+              <p:cNvSpPr/>
+              <p:nvPr/>
+            </p:nvSpPr>
+            <p:spPr>
+              <a:xfrm>
+                <a:off x="3606374" y="2677662"/>
+                <a:ext cx="750378" cy="585556"/>
+              </a:xfrm>
+              <a:prstGeom prst="chevron">
+                <a:avLst>
+                  <a:gd name="adj" fmla="val 96981"/>
+                </a:avLst>
+              </a:prstGeom>
+              <a:solidFill>
+                <a:schemeClr val="tx1">
+                  <a:lumMod val="95000"/>
+                  <a:lumOff val="5000"/>
+                </a:schemeClr>
+              </a:solidFill>
+              <a:ln>
+                <a:solidFill>
+                  <a:schemeClr val="tx1">
+                    <a:lumMod val="95000"/>
+                    <a:lumOff val="5000"/>
+                  </a:schemeClr>
+                </a:solidFill>
+              </a:ln>
+            </p:spPr>
+            <p:style>
+              <a:lnRef idx="2">
+                <a:schemeClr val="accent1">
+                  <a:shade val="50000"/>
+                </a:schemeClr>
+              </a:lnRef>
+              <a:fillRef idx="1">
+                <a:schemeClr val="accent1"/>
+              </a:fillRef>
+              <a:effectRef idx="0">
+                <a:schemeClr val="accent1"/>
+              </a:effectRef>
+              <a:fontRef idx="minor">
+                <a:schemeClr val="lt1"/>
+              </a:fontRef>
+            </p:style>
+            <p:txBody>
+              <a:bodyPr rtlCol="0" anchor="ctr"/>
+              <a:lstStyle/>
+              <a:p>
+                <a:pPr algn="ctr"/>
+                <a:endParaRPr lang="en-US">
+                  <a:solidFill>
+                    <a:schemeClr val="tx1"/>
+                  </a:solidFill>
+                </a:endParaRPr>
+              </a:p>
+            </p:txBody>
+          </p:sp>
+        </p:grpSp>
+        <p:sp>
+          <p:nvSpPr>
+            <p:cNvPr id="52" name="Chevron 51"/>
+            <p:cNvSpPr/>
+            <p:nvPr/>
+          </p:nvSpPr>
+          <p:spPr>
+            <a:xfrm rot="10800000">
+              <a:off x="4923432" y="3691639"/>
+              <a:ext cx="750378" cy="585556"/>
+            </a:xfrm>
+            <a:prstGeom prst="chevron">
+              <a:avLst>
+                <a:gd name="adj" fmla="val 96981"/>
+              </a:avLst>
+            </a:prstGeom>
+            <a:solidFill>
+              <a:schemeClr val="tx1">
+                <a:lumMod val="95000"/>
+                <a:lumOff val="5000"/>
+              </a:schemeClr>
+            </a:solidFill>
+            <a:ln>
+              <a:solidFill>
+                <a:schemeClr val="tx1">
+                  <a:lumMod val="95000"/>
+                  <a:lumOff val="5000"/>
+                </a:schemeClr>
+              </a:solidFill>
+            </a:ln>
+          </p:spPr>
+          <p:style>
+            <a:lnRef idx="2">
+              <a:schemeClr val="accent1">
+                <a:shade val="50000"/>
+              </a:schemeClr>
+            </a:lnRef>
+            <a:fillRef idx="1">
+              <a:schemeClr val="accent1"/>
+            </a:fillRef>
+            <a:effectRef idx="0">
+              <a:schemeClr val="accent1"/>
+            </a:effectRef>
+            <a:fontRef idx="minor">
+              <a:schemeClr val="lt1"/>
+            </a:fontRef>
+          </p:style>
+          <p:txBody>
+            <a:bodyPr rtlCol="0" anchor="ctr"/>
+            <a:lstStyle/>
+            <a:p>
+              <a:pPr algn="ctr"/>
+              <a:endParaRPr lang="en-US">
+                <a:solidFill>
+                  <a:schemeClr val="tx1"/>
+                </a:solidFill>
+              </a:endParaRPr>
+            </a:p>
+          </p:txBody>
+        </p:sp>
+      </p:grpSp>
+      <p:grpSp>
+        <p:nvGrpSpPr>
+          <p:cNvPr id="72" name="Group 71"/>
+          <p:cNvGrpSpPr/>
+          <p:nvPr/>
+        </p:nvGrpSpPr>
+        <p:grpSpPr>
+          <a:xfrm>
+            <a:off x="4556327" y="135337"/>
+            <a:ext cx="3377477" cy="3170195"/>
+            <a:chOff x="7479447" y="570195"/>
+            <a:chExt cx="3377477" cy="3170195"/>
+          </a:xfrm>
+        </p:grpSpPr>
+        <p:grpSp>
+          <p:nvGrpSpPr>
+            <p:cNvPr id="65" name="Group 64"/>
+            <p:cNvGrpSpPr/>
+            <p:nvPr/>
+          </p:nvGrpSpPr>
+          <p:grpSpPr>
+            <a:xfrm>
+              <a:off x="7479447" y="570195"/>
+              <a:ext cx="3377477" cy="3170195"/>
+              <a:chOff x="2867589" y="3020318"/>
+              <a:chExt cx="3377477" cy="3170195"/>
+            </a:xfrm>
+          </p:grpSpPr>
+          <p:grpSp>
+            <p:nvGrpSpPr>
+              <p:cNvPr id="66" name="Group 65"/>
+              <p:cNvGrpSpPr/>
+              <p:nvPr/>
+            </p:nvGrpSpPr>
+            <p:grpSpPr>
+              <a:xfrm>
+                <a:off x="2867589" y="3020318"/>
+                <a:ext cx="3377477" cy="3170195"/>
+                <a:chOff x="2979978" y="2006341"/>
+                <a:chExt cx="3377477" cy="3170195"/>
+              </a:xfrm>
+            </p:grpSpPr>
+            <p:pic>
+              <p:nvPicPr>
+                <p:cNvPr id="70" name="Picture 69"/>
+                <p:cNvPicPr>
+                  <a:picLocks noChangeAspect="1"/>
+                </p:cNvPicPr>
+                <p:nvPr/>
+              </p:nvPicPr>
+              <p:blipFill>
+                <a:blip r:embed="rId2">
+                  <a:extLst>
+                    <a:ext uri="{28A0092B-C50C-407E-A947-70E740481C1C}">
+                      <a14:useLocalDpi xmlns:a14="http://schemas.microsoft.com/office/drawing/2010/main" val="0"/>
+                    </a:ext>
+                  </a:extLst>
+                </a:blip>
+                <a:stretch>
+                  <a:fillRect/>
+                </a:stretch>
+              </p:blipFill>
+              <p:spPr>
+                <a:xfrm>
+                  <a:off x="2979978" y="2006341"/>
+                  <a:ext cx="3377477" cy="3170195"/>
+                </a:xfrm>
+                <a:prstGeom prst="rect">
+                  <a:avLst/>
+                </a:prstGeom>
+              </p:spPr>
+            </p:pic>
+            <p:sp>
+              <p:nvSpPr>
+                <p:cNvPr id="69" name="Chevron 68"/>
+                <p:cNvSpPr/>
+                <p:nvPr/>
+              </p:nvSpPr>
+              <p:spPr>
+                <a:xfrm>
+                  <a:off x="3606374" y="2677662"/>
+                  <a:ext cx="750378" cy="585556"/>
+                </a:xfrm>
+                <a:prstGeom prst="chevron">
+                  <a:avLst>
+                    <a:gd name="adj" fmla="val 88743"/>
+                  </a:avLst>
+                </a:prstGeom>
+                <a:solidFill>
+                  <a:schemeClr val="tx1">
+                    <a:lumMod val="95000"/>
+                    <a:lumOff val="5000"/>
+                  </a:schemeClr>
+                </a:solidFill>
+                <a:ln>
+                  <a:solidFill>
+                    <a:schemeClr val="tx1">
+                      <a:lumMod val="95000"/>
+                      <a:lumOff val="5000"/>
+                    </a:schemeClr>
+                  </a:solidFill>
+                </a:ln>
+              </p:spPr>
+              <p:style>
+                <a:lnRef idx="2">
+                  <a:schemeClr val="accent1">
+                    <a:shade val="50000"/>
+                  </a:schemeClr>
+                </a:lnRef>
+                <a:fillRef idx="1">
+                  <a:schemeClr val="accent1"/>
+                </a:fillRef>
+                <a:effectRef idx="0">
+                  <a:schemeClr val="accent1"/>
+                </a:effectRef>
+                <a:fontRef idx="minor">
+                  <a:schemeClr val="lt1"/>
+                </a:fontRef>
+              </p:style>
+              <p:txBody>
+                <a:bodyPr rtlCol="0" anchor="ctr"/>
+                <a:lstStyle/>
+                <a:p>
+                  <a:pPr algn="ctr"/>
+                  <a:endParaRPr lang="en-US">
+                    <a:solidFill>
+                      <a:schemeClr val="tx1"/>
+                    </a:solidFill>
+                  </a:endParaRPr>
+                </a:p>
+              </p:txBody>
+            </p:sp>
+          </p:grpSp>
+          <p:sp>
+            <p:nvSpPr>
+              <p:cNvPr id="67" name="Chevron 66"/>
+              <p:cNvSpPr/>
+              <p:nvPr/>
+            </p:nvSpPr>
+            <p:spPr>
+              <a:xfrm rot="11094768">
+                <a:off x="4923432" y="3691639"/>
+                <a:ext cx="750378" cy="585556"/>
+              </a:xfrm>
+              <a:prstGeom prst="chevron">
+                <a:avLst>
+                  <a:gd name="adj" fmla="val 83086"/>
+                </a:avLst>
+              </a:prstGeom>
+              <a:solidFill>
+                <a:schemeClr val="tx1">
+                  <a:lumMod val="95000"/>
+                  <a:lumOff val="5000"/>
+                </a:schemeClr>
+              </a:solidFill>
+              <a:ln>
+                <a:solidFill>
+                  <a:schemeClr val="tx1">
+                    <a:lumMod val="95000"/>
+                    <a:lumOff val="5000"/>
+                  </a:schemeClr>
+                </a:solidFill>
+              </a:ln>
+            </p:spPr>
+            <p:style>
+              <a:lnRef idx="2">
+                <a:schemeClr val="accent1">
+                  <a:shade val="50000"/>
+                </a:schemeClr>
+              </a:lnRef>
+              <a:fillRef idx="1">
+                <a:schemeClr val="accent1"/>
+              </a:fillRef>
+              <a:effectRef idx="0">
+                <a:schemeClr val="accent1"/>
+              </a:effectRef>
+              <a:fontRef idx="minor">
+                <a:schemeClr val="lt1"/>
+              </a:fontRef>
+            </p:style>
+            <p:txBody>
+              <a:bodyPr rtlCol="0" anchor="ctr"/>
+              <a:lstStyle/>
+              <a:p>
+                <a:pPr algn="ctr"/>
+                <a:endParaRPr lang="en-US">
+                  <a:solidFill>
+                    <a:schemeClr val="tx1"/>
+                  </a:solidFill>
+                </a:endParaRPr>
+              </a:p>
+            </p:txBody>
+          </p:sp>
+        </p:grpSp>
+        <p:sp>
+          <p:nvSpPr>
+            <p:cNvPr id="33" name="Freeform 32"/>
+            <p:cNvSpPr/>
+            <p:nvPr/>
+          </p:nvSpPr>
+          <p:spPr>
+            <a:xfrm>
+              <a:off x="8433372" y="2754608"/>
+              <a:ext cx="1477107" cy="211361"/>
+            </a:xfrm>
+            <a:custGeom>
+              <a:avLst/>
+              <a:gdLst>
+                <a:gd name="connsiteX0" fmla="*/ 0 w 1477107"/>
+                <a:gd name="connsiteY0" fmla="*/ 154745 h 211361"/>
+                <a:gd name="connsiteX1" fmla="*/ 70338 w 1477107"/>
+                <a:gd name="connsiteY1" fmla="*/ 126610 h 211361"/>
+                <a:gd name="connsiteX2" fmla="*/ 112541 w 1477107"/>
+                <a:gd name="connsiteY2" fmla="*/ 112542 h 211361"/>
+                <a:gd name="connsiteX3" fmla="*/ 225083 w 1477107"/>
+                <a:gd name="connsiteY3" fmla="*/ 126610 h 211361"/>
+                <a:gd name="connsiteX4" fmla="*/ 267286 w 1477107"/>
+                <a:gd name="connsiteY4" fmla="*/ 140677 h 211361"/>
+                <a:gd name="connsiteX5" fmla="*/ 337624 w 1477107"/>
+                <a:gd name="connsiteY5" fmla="*/ 182880 h 211361"/>
+                <a:gd name="connsiteX6" fmla="*/ 365760 w 1477107"/>
+                <a:gd name="connsiteY6" fmla="*/ 211016 h 211361"/>
+                <a:gd name="connsiteX7" fmla="*/ 478301 w 1477107"/>
+                <a:gd name="connsiteY7" fmla="*/ 182880 h 211361"/>
+                <a:gd name="connsiteX8" fmla="*/ 506437 w 1477107"/>
+                <a:gd name="connsiteY8" fmla="*/ 154745 h 211361"/>
+                <a:gd name="connsiteX9" fmla="*/ 576775 w 1477107"/>
+                <a:gd name="connsiteY9" fmla="*/ 98474 h 211361"/>
+                <a:gd name="connsiteX10" fmla="*/ 633046 w 1477107"/>
+                <a:gd name="connsiteY10" fmla="*/ 28136 h 211361"/>
+                <a:gd name="connsiteX11" fmla="*/ 717452 w 1477107"/>
+                <a:gd name="connsiteY11" fmla="*/ 0 h 211361"/>
+                <a:gd name="connsiteX12" fmla="*/ 815926 w 1477107"/>
+                <a:gd name="connsiteY12" fmla="*/ 28136 h 211361"/>
+                <a:gd name="connsiteX13" fmla="*/ 900332 w 1477107"/>
+                <a:gd name="connsiteY13" fmla="*/ 84406 h 211361"/>
+                <a:gd name="connsiteX14" fmla="*/ 928467 w 1477107"/>
+                <a:gd name="connsiteY14" fmla="*/ 112542 h 211361"/>
+                <a:gd name="connsiteX15" fmla="*/ 970670 w 1477107"/>
+                <a:gd name="connsiteY15" fmla="*/ 126610 h 211361"/>
+                <a:gd name="connsiteX16" fmla="*/ 998806 w 1477107"/>
+                <a:gd name="connsiteY16" fmla="*/ 154745 h 211361"/>
+                <a:gd name="connsiteX17" fmla="*/ 1181686 w 1477107"/>
+                <a:gd name="connsiteY17" fmla="*/ 154745 h 211361"/>
+                <a:gd name="connsiteX18" fmla="*/ 1266092 w 1477107"/>
+                <a:gd name="connsiteY18" fmla="*/ 112542 h 211361"/>
+                <a:gd name="connsiteX19" fmla="*/ 1308295 w 1477107"/>
+                <a:gd name="connsiteY19" fmla="*/ 98474 h 211361"/>
+                <a:gd name="connsiteX20" fmla="*/ 1350498 w 1477107"/>
+                <a:gd name="connsiteY20" fmla="*/ 70339 h 211361"/>
+                <a:gd name="connsiteX21" fmla="*/ 1378633 w 1477107"/>
+                <a:gd name="connsiteY21" fmla="*/ 42203 h 211361"/>
+                <a:gd name="connsiteX22" fmla="*/ 1420837 w 1477107"/>
+                <a:gd name="connsiteY22" fmla="*/ 28136 h 211361"/>
+                <a:gd name="connsiteX23" fmla="*/ 1477107 w 1477107"/>
+                <a:gd name="connsiteY23" fmla="*/ 70339 h 211361"/>
+              </a:gdLst>
+              <a:ahLst/>
+              <a:cxnLst>
+                <a:cxn ang="0">
+                  <a:pos x="connsiteX0" y="connsiteY0"/>
+                </a:cxn>
+                <a:cxn ang="0">
+                  <a:pos x="connsiteX1" y="connsiteY1"/>
+                </a:cxn>
+                <a:cxn ang="0">
+                  <a:pos x="connsiteX2" y="connsiteY2"/>
+                </a:cxn>
+                <a:cxn ang="0">
+                  <a:pos x="connsiteX3" y="connsiteY3"/>
+                </a:cxn>
+                <a:cxn ang="0">
+                  <a:pos x="connsiteX4" y="connsiteY4"/>
+                </a:cxn>
+                <a:cxn ang="0">
+                  <a:pos x="connsiteX5" y="connsiteY5"/>
+                </a:cxn>
+                <a:cxn ang="0">
+                  <a:pos x="connsiteX6" y="connsiteY6"/>
+                </a:cxn>
+                <a:cxn ang="0">
+                  <a:pos x="connsiteX7" y="connsiteY7"/>
+                </a:cxn>
+                <a:cxn ang="0">
+                  <a:pos x="connsiteX8" y="connsiteY8"/>
+                </a:cxn>
+                <a:cxn ang="0">
+                  <a:pos x="connsiteX9" y="connsiteY9"/>
+                </a:cxn>
+                <a:cxn ang="0">
+                  <a:pos x="connsiteX10" y="connsiteY10"/>
+                </a:cxn>
+                <a:cxn ang="0">
+                  <a:pos x="connsiteX11" y="connsiteY11"/>
+                </a:cxn>
+                <a:cxn ang="0">
+                  <a:pos x="connsiteX12" y="connsiteY12"/>
+                </a:cxn>
+                <a:cxn ang="0">
+                  <a:pos x="connsiteX13" y="connsiteY13"/>
+                </a:cxn>
+                <a:cxn ang="0">
+                  <a:pos x="connsiteX14" y="connsiteY14"/>
+                </a:cxn>
+                <a:cxn ang="0">
+                  <a:pos x="connsiteX15" y="connsiteY15"/>
+                </a:cxn>
+                <a:cxn ang="0">
+                  <a:pos x="connsiteX16" y="connsiteY16"/>
+                </a:cxn>
+                <a:cxn ang="0">
+                  <a:pos x="connsiteX17" y="connsiteY17"/>
+                </a:cxn>
+                <a:cxn ang="0">
+                  <a:pos x="connsiteX18" y="connsiteY18"/>
+                </a:cxn>
+                <a:cxn ang="0">
+                  <a:pos x="connsiteX19" y="connsiteY19"/>
+                </a:cxn>
+                <a:cxn ang="0">
+                  <a:pos x="connsiteX20" y="connsiteY20"/>
+                </a:cxn>
+                <a:cxn ang="0">
+                  <a:pos x="connsiteX21" y="connsiteY21"/>
+                </a:cxn>
+                <a:cxn ang="0">
+                  <a:pos x="connsiteX22" y="connsiteY22"/>
+                </a:cxn>
+                <a:cxn ang="0">
+                  <a:pos x="connsiteX23" y="connsiteY23"/>
+                </a:cxn>
+              </a:cxnLst>
+              <a:rect l="l" t="t" r="r" b="b"/>
+              <a:pathLst>
+                <a:path w="1477107" h="211361">
+                  <a:moveTo>
+                    <a:pt x="0" y="154745"/>
+                  </a:moveTo>
+                  <a:cubicBezTo>
+                    <a:pt x="23446" y="145367"/>
+                    <a:pt x="46694" y="135477"/>
+                    <a:pt x="70338" y="126610"/>
+                  </a:cubicBezTo>
+                  <a:cubicBezTo>
+                    <a:pt x="84222" y="121403"/>
+                    <a:pt x="97712" y="112542"/>
+                    <a:pt x="112541" y="112542"/>
+                  </a:cubicBezTo>
+                  <a:cubicBezTo>
+                    <a:pt x="150347" y="112542"/>
+                    <a:pt x="187569" y="121921"/>
+                    <a:pt x="225083" y="126610"/>
+                  </a:cubicBezTo>
+                  <a:cubicBezTo>
+                    <a:pt x="239151" y="131299"/>
+                    <a:pt x="254571" y="133048"/>
+                    <a:pt x="267286" y="140677"/>
+                  </a:cubicBezTo>
+                  <a:cubicBezTo>
+                    <a:pt x="363837" y="198608"/>
+                    <a:pt x="218070" y="143031"/>
+                    <a:pt x="337624" y="182880"/>
+                  </a:cubicBezTo>
+                  <a:cubicBezTo>
+                    <a:pt x="347003" y="192259"/>
+                    <a:pt x="352630" y="209140"/>
+                    <a:pt x="365760" y="211016"/>
+                  </a:cubicBezTo>
+                  <a:cubicBezTo>
+                    <a:pt x="389526" y="214411"/>
+                    <a:pt x="451315" y="191875"/>
+                    <a:pt x="478301" y="182880"/>
+                  </a:cubicBezTo>
+                  <a:cubicBezTo>
+                    <a:pt x="487680" y="173502"/>
+                    <a:pt x="496080" y="163030"/>
+                    <a:pt x="506437" y="154745"/>
+                  </a:cubicBezTo>
+                  <a:cubicBezTo>
+                    <a:pt x="547060" y="122247"/>
+                    <a:pt x="546582" y="136216"/>
+                    <a:pt x="576775" y="98474"/>
+                  </a:cubicBezTo>
+                  <a:cubicBezTo>
+                    <a:pt x="590030" y="81905"/>
+                    <a:pt x="610399" y="39459"/>
+                    <a:pt x="633046" y="28136"/>
+                  </a:cubicBezTo>
+                  <a:cubicBezTo>
+                    <a:pt x="659572" y="14873"/>
+                    <a:pt x="717452" y="0"/>
+                    <a:pt x="717452" y="0"/>
+                  </a:cubicBezTo>
+                  <a:cubicBezTo>
+                    <a:pt x="730698" y="3312"/>
+                    <a:pt x="799413" y="18962"/>
+                    <a:pt x="815926" y="28136"/>
+                  </a:cubicBezTo>
+                  <a:cubicBezTo>
+                    <a:pt x="845485" y="44558"/>
+                    <a:pt x="876422" y="60495"/>
+                    <a:pt x="900332" y="84406"/>
+                  </a:cubicBezTo>
+                  <a:cubicBezTo>
+                    <a:pt x="909710" y="93785"/>
+                    <a:pt x="917094" y="105718"/>
+                    <a:pt x="928467" y="112542"/>
+                  </a:cubicBezTo>
+                  <a:cubicBezTo>
+                    <a:pt x="941182" y="120171"/>
+                    <a:pt x="956602" y="121921"/>
+                    <a:pt x="970670" y="126610"/>
+                  </a:cubicBezTo>
+                  <a:cubicBezTo>
+                    <a:pt x="980049" y="135988"/>
+                    <a:pt x="987433" y="147921"/>
+                    <a:pt x="998806" y="154745"/>
+                  </a:cubicBezTo>
+                  <a:cubicBezTo>
+                    <a:pt x="1052609" y="187027"/>
+                    <a:pt x="1131471" y="159767"/>
+                    <a:pt x="1181686" y="154745"/>
+                  </a:cubicBezTo>
+                  <a:cubicBezTo>
+                    <a:pt x="1287765" y="119385"/>
+                    <a:pt x="1157010" y="167083"/>
+                    <a:pt x="1266092" y="112542"/>
+                  </a:cubicBezTo>
+                  <a:cubicBezTo>
+                    <a:pt x="1279355" y="105910"/>
+                    <a:pt x="1295032" y="105106"/>
+                    <a:pt x="1308295" y="98474"/>
+                  </a:cubicBezTo>
+                  <a:cubicBezTo>
+                    <a:pt x="1323417" y="90913"/>
+                    <a:pt x="1337296" y="80901"/>
+                    <a:pt x="1350498" y="70339"/>
+                  </a:cubicBezTo>
+                  <a:cubicBezTo>
+                    <a:pt x="1360855" y="62053"/>
+                    <a:pt x="1367260" y="49027"/>
+                    <a:pt x="1378633" y="42203"/>
+                  </a:cubicBezTo>
+                  <a:cubicBezTo>
+                    <a:pt x="1391349" y="34574"/>
+                    <a:pt x="1406769" y="32825"/>
+                    <a:pt x="1420837" y="28136"/>
+                  </a:cubicBezTo>
+                  <a:cubicBezTo>
+                    <a:pt x="1468558" y="59949"/>
+                    <a:pt x="1451085" y="44315"/>
+                    <a:pt x="1477107" y="70339"/>
+                  </a:cubicBezTo>
+                </a:path>
+              </a:pathLst>
+            </a:custGeom>
+            <a:noFill/>
+            <a:ln w="139700">
+              <a:solidFill>
+                <a:schemeClr val="tx1">
+                  <a:lumMod val="95000"/>
+                  <a:lumOff val="5000"/>
+                </a:schemeClr>
+              </a:solidFill>
+            </a:ln>
+          </p:spPr>
+          <p:style>
+            <a:lnRef idx="2">
+              <a:schemeClr val="accent1">
+                <a:shade val="50000"/>
+              </a:schemeClr>
+            </a:lnRef>
+            <a:fillRef idx="1">
+              <a:schemeClr val="accent1"/>
+            </a:fillRef>
+            <a:effectRef idx="0">
+              <a:schemeClr val="accent1"/>
+            </a:effectRef>
+            <a:fontRef idx="minor">
+              <a:schemeClr val="lt1"/>
+            </a:fontRef>
+          </p:style>
+          <p:txBody>
+            <a:bodyPr rtlCol="0" anchor="ctr"/>
+            <a:lstStyle/>
+            <a:p>
+              <a:pPr algn="ctr"/>
+              <a:endParaRPr lang="en-US"/>
+            </a:p>
+          </p:txBody>
+        </p:sp>
+      </p:grpSp>
+      <p:grpSp>
+        <p:nvGrpSpPr>
+          <p:cNvPr id="86" name="Group 85"/>
+          <p:cNvGrpSpPr/>
+          <p:nvPr/>
+        </p:nvGrpSpPr>
+        <p:grpSpPr>
+          <a:xfrm>
+            <a:off x="7415222" y="3131477"/>
+            <a:ext cx="3377477" cy="3170195"/>
+            <a:chOff x="7415222" y="3131477"/>
+            <a:chExt cx="3377477" cy="3170195"/>
+          </a:xfrm>
+        </p:grpSpPr>
+        <p:grpSp>
+          <p:nvGrpSpPr>
+            <p:cNvPr id="74" name="Group 73"/>
+            <p:cNvGrpSpPr/>
+            <p:nvPr/>
+          </p:nvGrpSpPr>
+          <p:grpSpPr>
+            <a:xfrm>
+              <a:off x="7415222" y="3131477"/>
+              <a:ext cx="3377477" cy="3170195"/>
+              <a:chOff x="2867589" y="3020318"/>
+              <a:chExt cx="3377477" cy="3170195"/>
+            </a:xfrm>
+          </p:grpSpPr>
+          <p:grpSp>
+            <p:nvGrpSpPr>
+              <p:cNvPr id="76" name="Group 75"/>
+              <p:cNvGrpSpPr/>
+              <p:nvPr/>
+            </p:nvGrpSpPr>
+            <p:grpSpPr>
+              <a:xfrm>
+                <a:off x="2867589" y="3020318"/>
+                <a:ext cx="3377477" cy="3170195"/>
+                <a:chOff x="2979978" y="2006341"/>
+                <a:chExt cx="3377477" cy="3170195"/>
+              </a:xfrm>
+            </p:grpSpPr>
+            <p:pic>
+              <p:nvPicPr>
+                <p:cNvPr id="78" name="Picture 77"/>
+                <p:cNvPicPr>
+                  <a:picLocks noChangeAspect="1"/>
+                </p:cNvPicPr>
+                <p:nvPr/>
+              </p:nvPicPr>
+              <p:blipFill>
+                <a:blip r:embed="rId2">
+                  <a:extLst>
+                    <a:ext uri="{28A0092B-C50C-407E-A947-70E740481C1C}">
+                      <a14:useLocalDpi xmlns:a14="http://schemas.microsoft.com/office/drawing/2010/main" val="0"/>
+                    </a:ext>
+                  </a:extLst>
+                </a:blip>
+                <a:stretch>
+                  <a:fillRect/>
+                </a:stretch>
+              </p:blipFill>
+              <p:spPr>
+                <a:xfrm>
+                  <a:off x="2979978" y="2006341"/>
+                  <a:ext cx="3377477" cy="3170195"/>
+                </a:xfrm>
+                <a:prstGeom prst="rect">
+                  <a:avLst/>
+                </a:prstGeom>
+              </p:spPr>
+            </p:pic>
+            <p:sp>
+              <p:nvSpPr>
+                <p:cNvPr id="79" name="Chevron 78"/>
+                <p:cNvSpPr/>
+                <p:nvPr/>
+              </p:nvSpPr>
+              <p:spPr>
+                <a:xfrm rot="717310">
+                  <a:off x="3606407" y="2677974"/>
+                  <a:ext cx="753335" cy="584931"/>
+                </a:xfrm>
+                <a:prstGeom prst="chevron">
+                  <a:avLst>
+                    <a:gd name="adj" fmla="val 91777"/>
+                  </a:avLst>
+                </a:prstGeom>
+                <a:solidFill>
+                  <a:schemeClr val="tx1">
+                    <a:lumMod val="95000"/>
+                    <a:lumOff val="5000"/>
+                  </a:schemeClr>
+                </a:solidFill>
+                <a:ln>
+                  <a:solidFill>
+                    <a:schemeClr val="tx1">
+                      <a:lumMod val="95000"/>
+                      <a:lumOff val="5000"/>
+                    </a:schemeClr>
+                  </a:solidFill>
+                </a:ln>
+              </p:spPr>
+              <p:style>
+                <a:lnRef idx="2">
+                  <a:schemeClr val="accent1">
+                    <a:shade val="50000"/>
+                  </a:schemeClr>
+                </a:lnRef>
+                <a:fillRef idx="1">
+                  <a:schemeClr val="accent1"/>
+                </a:fillRef>
+                <a:effectRef idx="0">
+                  <a:schemeClr val="accent1"/>
+                </a:effectRef>
+                <a:fontRef idx="minor">
+                  <a:schemeClr val="lt1"/>
+                </a:fontRef>
+              </p:style>
+              <p:txBody>
+                <a:bodyPr rtlCol="0" anchor="ctr"/>
+                <a:lstStyle/>
+                <a:p>
+                  <a:pPr algn="ctr"/>
+                  <a:endParaRPr lang="en-US">
+                    <a:solidFill>
+                      <a:schemeClr val="tx1"/>
+                    </a:solidFill>
+                  </a:endParaRPr>
+                </a:p>
+              </p:txBody>
+            </p:sp>
+          </p:grpSp>
+          <p:sp>
+            <p:nvSpPr>
+              <p:cNvPr id="77" name="Chevron 76"/>
+              <p:cNvSpPr/>
+              <p:nvPr/>
+            </p:nvSpPr>
+            <p:spPr>
+              <a:xfrm rot="10080000">
+                <a:off x="4935154" y="3690407"/>
+                <a:ext cx="738759" cy="587781"/>
+              </a:xfrm>
+              <a:prstGeom prst="chevron">
+                <a:avLst>
+                  <a:gd name="adj" fmla="val 86083"/>
+                </a:avLst>
+              </a:prstGeom>
+              <a:solidFill>
+                <a:schemeClr val="tx1">
+                  <a:lumMod val="95000"/>
+                  <a:lumOff val="5000"/>
+                </a:schemeClr>
+              </a:solidFill>
+              <a:ln>
+                <a:solidFill>
+                  <a:schemeClr val="tx1">
+                    <a:lumMod val="95000"/>
+                    <a:lumOff val="5000"/>
+                  </a:schemeClr>
+                </a:solidFill>
+              </a:ln>
+            </p:spPr>
+            <p:style>
+              <a:lnRef idx="2">
+                <a:schemeClr val="accent1">
+                  <a:shade val="50000"/>
+                </a:schemeClr>
+              </a:lnRef>
+              <a:fillRef idx="1">
+                <a:schemeClr val="accent1"/>
+              </a:fillRef>
+              <a:effectRef idx="0">
+                <a:schemeClr val="accent1"/>
+              </a:effectRef>
+              <a:fontRef idx="minor">
+                <a:schemeClr val="lt1"/>
+              </a:fontRef>
+            </p:style>
+            <p:txBody>
+              <a:bodyPr rtlCol="0" anchor="ctr"/>
+              <a:lstStyle/>
+              <a:p>
+                <a:pPr algn="ctr"/>
+                <a:endParaRPr lang="en-US">
+                  <a:solidFill>
+                    <a:schemeClr val="tx1"/>
+                  </a:solidFill>
+                </a:endParaRPr>
+              </a:p>
+            </p:txBody>
+          </p:sp>
+        </p:grpSp>
+        <p:sp>
+          <p:nvSpPr>
+            <p:cNvPr id="85" name="Freeform 84"/>
+            <p:cNvSpPr/>
+            <p:nvPr/>
+          </p:nvSpPr>
+          <p:spPr>
+            <a:xfrm rot="21331896">
+              <a:off x="8403483" y="5209545"/>
+              <a:ext cx="1400952" cy="342305"/>
+            </a:xfrm>
+            <a:custGeom>
+              <a:avLst/>
+              <a:gdLst>
+                <a:gd name="connsiteX0" fmla="*/ 0 w 1295871"/>
+                <a:gd name="connsiteY0" fmla="*/ 84407 h 365760"/>
+                <a:gd name="connsiteX1" fmla="*/ 28135 w 1295871"/>
+                <a:gd name="connsiteY1" fmla="*/ 196948 h 365760"/>
+                <a:gd name="connsiteX2" fmla="*/ 84406 w 1295871"/>
+                <a:gd name="connsiteY2" fmla="*/ 253219 h 365760"/>
+                <a:gd name="connsiteX3" fmla="*/ 126609 w 1295871"/>
+                <a:gd name="connsiteY3" fmla="*/ 267287 h 365760"/>
+                <a:gd name="connsiteX4" fmla="*/ 211015 w 1295871"/>
+                <a:gd name="connsiteY4" fmla="*/ 225084 h 365760"/>
+                <a:gd name="connsiteX5" fmla="*/ 267286 w 1295871"/>
+                <a:gd name="connsiteY5" fmla="*/ 154745 h 365760"/>
+                <a:gd name="connsiteX6" fmla="*/ 309489 w 1295871"/>
+                <a:gd name="connsiteY6" fmla="*/ 112542 h 365760"/>
+                <a:gd name="connsiteX7" fmla="*/ 393895 w 1295871"/>
+                <a:gd name="connsiteY7" fmla="*/ 0 h 365760"/>
+                <a:gd name="connsiteX8" fmla="*/ 464233 w 1295871"/>
+                <a:gd name="connsiteY8" fmla="*/ 14068 h 365760"/>
+                <a:gd name="connsiteX9" fmla="*/ 506436 w 1295871"/>
+                <a:gd name="connsiteY9" fmla="*/ 28136 h 365760"/>
+                <a:gd name="connsiteX10" fmla="*/ 520504 w 1295871"/>
+                <a:gd name="connsiteY10" fmla="*/ 70339 h 365760"/>
+                <a:gd name="connsiteX11" fmla="*/ 520504 w 1295871"/>
+                <a:gd name="connsiteY11" fmla="*/ 323557 h 365760"/>
+                <a:gd name="connsiteX12" fmla="*/ 618978 w 1295871"/>
+                <a:gd name="connsiteY12" fmla="*/ 309490 h 365760"/>
+                <a:gd name="connsiteX13" fmla="*/ 675249 w 1295871"/>
+                <a:gd name="connsiteY13" fmla="*/ 253219 h 365760"/>
+                <a:gd name="connsiteX14" fmla="*/ 759655 w 1295871"/>
+                <a:gd name="connsiteY14" fmla="*/ 182880 h 365760"/>
+                <a:gd name="connsiteX15" fmla="*/ 773723 w 1295871"/>
+                <a:gd name="connsiteY15" fmla="*/ 140677 h 365760"/>
+                <a:gd name="connsiteX16" fmla="*/ 801858 w 1295871"/>
+                <a:gd name="connsiteY16" fmla="*/ 98474 h 365760"/>
+                <a:gd name="connsiteX17" fmla="*/ 886264 w 1295871"/>
+                <a:gd name="connsiteY17" fmla="*/ 56271 h 365760"/>
+                <a:gd name="connsiteX18" fmla="*/ 984738 w 1295871"/>
+                <a:gd name="connsiteY18" fmla="*/ 126610 h 365760"/>
+                <a:gd name="connsiteX19" fmla="*/ 998806 w 1295871"/>
+                <a:gd name="connsiteY19" fmla="*/ 323557 h 365760"/>
+                <a:gd name="connsiteX20" fmla="*/ 1041009 w 1295871"/>
+                <a:gd name="connsiteY20" fmla="*/ 337625 h 365760"/>
+                <a:gd name="connsiteX21" fmla="*/ 1125415 w 1295871"/>
+                <a:gd name="connsiteY21" fmla="*/ 295422 h 365760"/>
+                <a:gd name="connsiteX22" fmla="*/ 1153550 w 1295871"/>
+                <a:gd name="connsiteY22" fmla="*/ 253219 h 365760"/>
+                <a:gd name="connsiteX23" fmla="*/ 1181686 w 1295871"/>
+                <a:gd name="connsiteY23" fmla="*/ 225084 h 365760"/>
+                <a:gd name="connsiteX24" fmla="*/ 1223889 w 1295871"/>
+                <a:gd name="connsiteY24" fmla="*/ 154745 h 365760"/>
+                <a:gd name="connsiteX25" fmla="*/ 1266092 w 1295871"/>
+                <a:gd name="connsiteY25" fmla="*/ 168813 h 365760"/>
+                <a:gd name="connsiteX26" fmla="*/ 1294227 w 1295871"/>
+                <a:gd name="connsiteY26" fmla="*/ 365760 h 365760"/>
+              </a:gdLst>
+              <a:ahLst/>
+              <a:cxnLst>
+                <a:cxn ang="0">
+                  <a:pos x="connsiteX0" y="connsiteY0"/>
+                </a:cxn>
+                <a:cxn ang="0">
+                  <a:pos x="connsiteX1" y="connsiteY1"/>
+                </a:cxn>
+                <a:cxn ang="0">
+                  <a:pos x="connsiteX2" y="connsiteY2"/>
+                </a:cxn>
+                <a:cxn ang="0">
+                  <a:pos x="connsiteX3" y="connsiteY3"/>
+                </a:cxn>
+                <a:cxn ang="0">
+                  <a:pos x="connsiteX4" y="connsiteY4"/>
+                </a:cxn>
+                <a:cxn ang="0">
+                  <a:pos x="connsiteX5" y="connsiteY5"/>
+                </a:cxn>
+                <a:cxn ang="0">
+                  <a:pos x="connsiteX6" y="connsiteY6"/>
+                </a:cxn>
+                <a:cxn ang="0">
+                  <a:pos x="connsiteX7" y="connsiteY7"/>
+                </a:cxn>
+                <a:cxn ang="0">
+                  <a:pos x="connsiteX8" y="connsiteY8"/>
+                </a:cxn>
+                <a:cxn ang="0">
+                  <a:pos x="connsiteX9" y="connsiteY9"/>
+                </a:cxn>
+                <a:cxn ang="0">
+                  <a:pos x="connsiteX10" y="connsiteY10"/>
+                </a:cxn>
+                <a:cxn ang="0">
+                  <a:pos x="connsiteX11" y="connsiteY11"/>
+                </a:cxn>
+                <a:cxn ang="0">
+                  <a:pos x="connsiteX12" y="connsiteY12"/>
+                </a:cxn>
+                <a:cxn ang="0">
+                  <a:pos x="connsiteX13" y="connsiteY13"/>
+                </a:cxn>
+                <a:cxn ang="0">
+                  <a:pos x="connsiteX14" y="connsiteY14"/>
+                </a:cxn>
+                <a:cxn ang="0">
+                  <a:pos x="connsiteX15" y="connsiteY15"/>
+                </a:cxn>
+                <a:cxn ang="0">
+                  <a:pos x="connsiteX16" y="connsiteY16"/>
+                </a:cxn>
+                <a:cxn ang="0">
+                  <a:pos x="connsiteX17" y="connsiteY17"/>
+                </a:cxn>
+                <a:cxn ang="0">
+                  <a:pos x="connsiteX18" y="connsiteY18"/>
+                </a:cxn>
+                <a:cxn ang="0">
+                  <a:pos x="connsiteX19" y="connsiteY19"/>
+                </a:cxn>
+                <a:cxn ang="0">
+                  <a:pos x="connsiteX20" y="connsiteY20"/>
+                </a:cxn>
+                <a:cxn ang="0">
+                  <a:pos x="connsiteX21" y="connsiteY21"/>
+                </a:cxn>
+                <a:cxn ang="0">
+                  <a:pos x="connsiteX22" y="connsiteY22"/>
+                </a:cxn>
+                <a:cxn ang="0">
+                  <a:pos x="connsiteX23" y="connsiteY23"/>
+                </a:cxn>
+                <a:cxn ang="0">
+                  <a:pos x="connsiteX24" y="connsiteY24"/>
+                </a:cxn>
+                <a:cxn ang="0">
+                  <a:pos x="connsiteX25" y="connsiteY25"/>
+                </a:cxn>
+                <a:cxn ang="0">
+                  <a:pos x="connsiteX26" y="connsiteY26"/>
+                </a:cxn>
+              </a:cxnLst>
+              <a:rect l="l" t="t" r="r" b="b"/>
+              <a:pathLst>
+                <a:path w="1295871" h="365760">
+                  <a:moveTo>
+                    <a:pt x="0" y="84407"/>
+                  </a:moveTo>
+                  <a:cubicBezTo>
+                    <a:pt x="1476" y="91788"/>
+                    <a:pt x="16118" y="180124"/>
+                    <a:pt x="28135" y="196948"/>
+                  </a:cubicBezTo>
+                  <a:cubicBezTo>
+                    <a:pt x="43553" y="218533"/>
+                    <a:pt x="59241" y="244830"/>
+                    <a:pt x="84406" y="253219"/>
+                  </a:cubicBezTo>
+                  <a:lnTo>
+                    <a:pt x="126609" y="267287"/>
+                  </a:lnTo>
+                  <a:cubicBezTo>
+                    <a:pt x="171182" y="252429"/>
+                    <a:pt x="172059" y="256249"/>
+                    <a:pt x="211015" y="225084"/>
+                  </a:cubicBezTo>
+                  <a:cubicBezTo>
+                    <a:pt x="251938" y="192345"/>
+                    <a:pt x="230731" y="198611"/>
+                    <a:pt x="267286" y="154745"/>
+                  </a:cubicBezTo>
+                  <a:cubicBezTo>
+                    <a:pt x="280022" y="139462"/>
+                    <a:pt x="297275" y="128246"/>
+                    <a:pt x="309489" y="112542"/>
+                  </a:cubicBezTo>
+                  <a:cubicBezTo>
+                    <a:pt x="420844" y="-30628"/>
+                    <a:pt x="323130" y="70768"/>
+                    <a:pt x="393895" y="0"/>
+                  </a:cubicBezTo>
+                  <a:cubicBezTo>
+                    <a:pt x="417341" y="4689"/>
+                    <a:pt x="441037" y="8269"/>
+                    <a:pt x="464233" y="14068"/>
+                  </a:cubicBezTo>
+                  <a:cubicBezTo>
+                    <a:pt x="478619" y="17665"/>
+                    <a:pt x="495951" y="17651"/>
+                    <a:pt x="506436" y="28136"/>
+                  </a:cubicBezTo>
+                  <a:cubicBezTo>
+                    <a:pt x="516921" y="38621"/>
+                    <a:pt x="515815" y="56271"/>
+                    <a:pt x="520504" y="70339"/>
+                  </a:cubicBezTo>
+                  <a:cubicBezTo>
+                    <a:pt x="516752" y="104102"/>
+                    <a:pt x="486741" y="289794"/>
+                    <a:pt x="520504" y="323557"/>
+                  </a:cubicBezTo>
+                  <a:cubicBezTo>
+                    <a:pt x="543950" y="347003"/>
+                    <a:pt x="586153" y="314179"/>
+                    <a:pt x="618978" y="309490"/>
+                  </a:cubicBezTo>
+                  <a:cubicBezTo>
+                    <a:pt x="637735" y="290733"/>
+                    <a:pt x="653178" y="267933"/>
+                    <a:pt x="675249" y="253219"/>
+                  </a:cubicBezTo>
+                  <a:cubicBezTo>
+                    <a:pt x="734006" y="214048"/>
+                    <a:pt x="705497" y="237039"/>
+                    <a:pt x="759655" y="182880"/>
+                  </a:cubicBezTo>
+                  <a:cubicBezTo>
+                    <a:pt x="764344" y="168812"/>
+                    <a:pt x="767091" y="153940"/>
+                    <a:pt x="773723" y="140677"/>
+                  </a:cubicBezTo>
+                  <a:cubicBezTo>
+                    <a:pt x="781284" y="125555"/>
+                    <a:pt x="789903" y="110429"/>
+                    <a:pt x="801858" y="98474"/>
+                  </a:cubicBezTo>
+                  <a:cubicBezTo>
+                    <a:pt x="829128" y="71204"/>
+                    <a:pt x="851940" y="67712"/>
+                    <a:pt x="886264" y="56271"/>
+                  </a:cubicBezTo>
+                  <a:cubicBezTo>
+                    <a:pt x="984738" y="89096"/>
+                    <a:pt x="961291" y="56272"/>
+                    <a:pt x="984738" y="126610"/>
+                  </a:cubicBezTo>
+                  <a:cubicBezTo>
+                    <a:pt x="989427" y="192259"/>
+                    <a:pt x="981848" y="259963"/>
+                    <a:pt x="998806" y="323557"/>
+                  </a:cubicBezTo>
+                  <a:cubicBezTo>
+                    <a:pt x="1002627" y="337885"/>
+                    <a:pt x="1026180" y="337625"/>
+                    <a:pt x="1041009" y="337625"/>
+                  </a:cubicBezTo>
+                  <a:cubicBezTo>
+                    <a:pt x="1070129" y="337625"/>
+                    <a:pt x="1104078" y="309646"/>
+                    <a:pt x="1125415" y="295422"/>
+                  </a:cubicBezTo>
+                  <a:cubicBezTo>
+                    <a:pt x="1134793" y="281354"/>
+                    <a:pt x="1142988" y="266421"/>
+                    <a:pt x="1153550" y="253219"/>
+                  </a:cubicBezTo>
+                  <a:cubicBezTo>
+                    <a:pt x="1161836" y="242862"/>
+                    <a:pt x="1174862" y="236457"/>
+                    <a:pt x="1181686" y="225084"/>
+                  </a:cubicBezTo>
+                  <a:cubicBezTo>
+                    <a:pt x="1236471" y="133774"/>
+                    <a:pt x="1152599" y="226032"/>
+                    <a:pt x="1223889" y="154745"/>
+                  </a:cubicBezTo>
+                  <a:cubicBezTo>
+                    <a:pt x="1237957" y="159434"/>
+                    <a:pt x="1257473" y="156746"/>
+                    <a:pt x="1266092" y="168813"/>
+                  </a:cubicBezTo>
+                  <a:cubicBezTo>
+                    <a:pt x="1306090" y="224810"/>
+                    <a:pt x="1294227" y="304513"/>
+                    <a:pt x="1294227" y="365760"/>
+                  </a:cubicBezTo>
+                </a:path>
+              </a:pathLst>
+            </a:custGeom>
+            <a:noFill/>
+            <a:ln w="139700">
+              <a:solidFill>
+                <a:schemeClr val="tx1"/>
+              </a:solidFill>
+            </a:ln>
+          </p:spPr>
+          <p:style>
+            <a:lnRef idx="2">
+              <a:schemeClr val="accent1">
+                <a:shade val="50000"/>
+              </a:schemeClr>
+            </a:lnRef>
+            <a:fillRef idx="1">
+              <a:schemeClr val="accent1"/>
+            </a:fillRef>
+            <a:effectRef idx="0">
+              <a:schemeClr val="accent1"/>
+            </a:effectRef>
+            <a:fontRef idx="minor">
+              <a:schemeClr val="lt1"/>
+            </a:fontRef>
+          </p:style>
+          <p:txBody>
+            <a:bodyPr rtlCol="0" anchor="ctr"/>
+            <a:lstStyle/>
+            <a:p>
+              <a:pPr algn="ctr"/>
+              <a:endParaRPr lang="en-US"/>
+            </a:p>
+          </p:txBody>
+        </p:sp>
+      </p:grpSp>
+    </p:spTree>
+    <p:extLst>
+      <p:ext uri="{BB962C8B-B14F-4D97-AF65-F5344CB8AC3E}">
+        <p14:creationId xmlns:p14="http://schemas.microsoft.com/office/powerpoint/2010/main" val="834901431"/>
+      </p:ext>
+    </p:extLst>
+  </p:cSld>
+  <p:clrMapOvr>
+    <a:masterClrMapping/>
+  </p:clrMapOvr>
+  <p:timing>
+    <p:tnLst>
+      <p:par>
+        <p:cTn id="1" dur="indefinite" restart="never" nodeType="tmRoot"/>
+      </p:par>
+    </p:tnLst>
+  </p:timing>
 </p:sld>
 </file>
 

</xml_diff>